<commit_message>
bugfix; creato container con Prometheus; aggiunti exporter su gettimeseries e usersmanager di tipo custom exporter e kafka (aggiunto exporter per kafka) di tipo cAdvisor
</commit_message>
<xml_diff>
--- a/_relazione/Presentazione progetto PANDOLFO.pptx
+++ b/_relazione/Presentazione progetto PANDOLFO.pptx
@@ -3590,7 +3590,7 @@
           <a:ln>
             <a:extLst>
               <a:ext uri="{C807C97D-BFC1-408E-A445-0C87EB9F89A2}">
-                <ask:lineSketchStyleProps xmlns="" xmlns:ask="http://schemas.microsoft.com/office/drawing/2018/sketchyshapes" sd="2244232375">
+                <ask:lineSketchStyleProps xmlns:ask="http://schemas.microsoft.com/office/drawing/2018/sketchyshapes" sd="2244232375">
                   <a:prstGeom prst="rect">
                     <a:avLst/>
                   </a:prstGeom>
@@ -3883,7 +3883,7 @@
             <a:ln>
               <a:extLst>
                 <a:ext uri="{C807C97D-BFC1-408E-A445-0C87EB9F89A2}">
-                  <ask:lineSketchStyleProps xmlns="" xmlns:ask="http://schemas.microsoft.com/office/drawing/2018/sketchyshapes" sd="2244232375">
+                  <ask:lineSketchStyleProps xmlns:ask="http://schemas.microsoft.com/office/drawing/2018/sketchyshapes" sd="2244232375">
                     <a:prstGeom prst="rect">
                       <a:avLst/>
                     </a:prstGeom>
@@ -4126,7 +4126,7 @@
             <a:ln>
               <a:extLst>
                 <a:ext uri="{C807C97D-BFC1-408E-A445-0C87EB9F89A2}">
-                  <ask:lineSketchStyleProps xmlns="" xmlns:ask="http://schemas.microsoft.com/office/drawing/2018/sketchyshapes" sd="2244232375">
+                  <ask:lineSketchStyleProps xmlns:ask="http://schemas.microsoft.com/office/drawing/2018/sketchyshapes" sd="2244232375">
                     <a:prstGeom prst="rect">
                       <a:avLst/>
                     </a:prstGeom>
@@ -4198,16 +4198,16 @@
           <a:custGeom>
             <a:avLst/>
             <a:gdLst>
-              <a:gd name="connsiteX0" fmla="*/ 0 w 5836595"/>
-              <a:gd name="connsiteY0" fmla="*/ 0 h 5593079"/>
-              <a:gd name="connsiteX1" fmla="*/ 5836595 w 5836595"/>
-              <a:gd name="connsiteY1" fmla="*/ 0 h 5593079"/>
-              <a:gd name="connsiteX2" fmla="*/ 5836595 w 5836595"/>
-              <a:gd name="connsiteY2" fmla="*/ 5593079 h 5593079"/>
-              <a:gd name="connsiteX3" fmla="*/ 0 w 5836595"/>
-              <a:gd name="connsiteY3" fmla="*/ 5593079 h 5593079"/>
-              <a:gd name="connsiteX4" fmla="*/ 0 w 5836595"/>
-              <a:gd name="connsiteY4" fmla="*/ 0 h 5593079"/>
+              <a:gd name="connsiteX0" fmla="*/ 0 w 6188266"/>
+              <a:gd name="connsiteY0" fmla="*/ 0 h 5189231"/>
+              <a:gd name="connsiteX1" fmla="*/ 6188266 w 6188266"/>
+              <a:gd name="connsiteY1" fmla="*/ 0 h 5189231"/>
+              <a:gd name="connsiteX2" fmla="*/ 6188266 w 6188266"/>
+              <a:gd name="connsiteY2" fmla="*/ 5189231 h 5189231"/>
+              <a:gd name="connsiteX3" fmla="*/ 0 w 6188266"/>
+              <a:gd name="connsiteY3" fmla="*/ 5189231 h 5189231"/>
+              <a:gd name="connsiteX4" fmla="*/ 0 w 6188266"/>
+              <a:gd name="connsiteY4" fmla="*/ 0 h 5189231"/>
             </a:gdLst>
             <a:ahLst/>
             <a:cxnLst>
@@ -4229,28 +4229,28 @@
             </a:cxnLst>
             <a:rect l="l" t="t" r="r" b="b"/>
             <a:pathLst>
-              <a:path w="5836595" h="5593079" extrusionOk="0">
+              <a:path w="6188266" h="5189231" extrusionOk="0">
                 <a:moveTo>
                   <a:pt x="0" y="0"/>
                 </a:moveTo>
                 <a:cubicBezTo>
-                  <a:pt x="2438026" y="-5264"/>
-                  <a:pt x="4830497" y="84467"/>
-                  <a:pt x="5836595" y="0"/>
-                </a:cubicBezTo>
-                <a:cubicBezTo>
-                  <a:pt x="5708422" y="2403091"/>
-                  <a:pt x="5965745" y="3020250"/>
-                  <a:pt x="5836595" y="5593079"/>
-                </a:cubicBezTo>
-                <a:cubicBezTo>
-                  <a:pt x="4984392" y="5699399"/>
-                  <a:pt x="2715717" y="5585430"/>
-                  <a:pt x="0" y="5593079"/>
-                </a:cubicBezTo>
-                <a:cubicBezTo>
-                  <a:pt x="160128" y="3458748"/>
-                  <a:pt x="25049" y="2480559"/>
+                  <a:pt x="835049" y="-5264"/>
+                  <a:pt x="4169003" y="84467"/>
+                  <a:pt x="6188266" y="0"/>
+                </a:cubicBezTo>
+                <a:cubicBezTo>
+                  <a:pt x="6060093" y="1146612"/>
+                  <a:pt x="6317416" y="4306876"/>
+                  <a:pt x="6188266" y="5189231"/>
+                </a:cubicBezTo>
+                <a:cubicBezTo>
+                  <a:pt x="3528930" y="5295551"/>
+                  <a:pt x="1022114" y="5181582"/>
+                  <a:pt x="0" y="5189231"/>
+                </a:cubicBezTo>
+                <a:cubicBezTo>
+                  <a:pt x="160128" y="2873168"/>
+                  <a:pt x="25049" y="576500"/>
                   <a:pt x="0" y="0"/>
                 </a:cubicBezTo>
                 <a:close/>
@@ -4262,7 +4262,7 @@
             <a:prstDash val="dash"/>
             <a:extLst>
               <a:ext uri="{C807C97D-BFC1-408E-A445-0C87EB9F89A2}">
-                <ask:lineSketchStyleProps xmlns="" xmlns:ask="http://schemas.microsoft.com/office/drawing/2018/sketchyshapes" sd="2650216993">
+                <ask:lineSketchStyleProps xmlns:ask="http://schemas.microsoft.com/office/drawing/2018/sketchyshapes" sd="2650216993">
                   <a:prstGeom prst="rect">
                     <a:avLst/>
                   </a:prstGeom>
@@ -4323,13 +4323,14 @@
           </p:cNvPr>
           <p:cNvCxnSpPr>
             <a:cxnSpLocks/>
+            <a:endCxn id="15" idx="1"/>
           </p:cNvCxnSpPr>
           <p:nvPr/>
         </p:nvCxnSpPr>
         <p:spPr>
           <a:xfrm>
-            <a:off x="9007815" y="2001717"/>
-            <a:ext cx="876218" cy="0"/>
+            <a:off x="9023470" y="1991897"/>
+            <a:ext cx="1034931" cy="0"/>
           </a:xfrm>
           <a:prstGeom prst="line">
             <a:avLst/>
@@ -4373,7 +4374,7 @@
         </p:nvSpPr>
         <p:spPr>
           <a:xfrm>
-            <a:off x="9408122" y="1746633"/>
+            <a:off x="9602677" y="1727177"/>
             <a:ext cx="433132" cy="276999"/>
           </a:xfrm>
           <a:prstGeom prst="rect">
@@ -4413,54 +4414,54 @@
         </p:nvSpPr>
         <p:spPr>
           <a:xfrm>
-            <a:off x="9883299" y="1242959"/>
+            <a:off x="10048673" y="1379157"/>
             <a:ext cx="1273985" cy="2130358"/>
           </a:xfrm>
           <a:custGeom>
             <a:avLst/>
             <a:gdLst>
-              <a:gd name="connsiteX0" fmla="*/ 0 w 1809345"/>
-              <a:gd name="connsiteY0" fmla="*/ 226168 h 2130358"/>
-              <a:gd name="connsiteX1" fmla="*/ 904673 w 1809345"/>
-              <a:gd name="connsiteY1" fmla="*/ 452336 h 2130358"/>
-              <a:gd name="connsiteX2" fmla="*/ 1809346 w 1809345"/>
-              <a:gd name="connsiteY2" fmla="*/ 226168 h 2130358"/>
-              <a:gd name="connsiteX3" fmla="*/ 1809345 w 1809345"/>
-              <a:gd name="connsiteY3" fmla="*/ 1904190 h 2130358"/>
-              <a:gd name="connsiteX4" fmla="*/ 904672 w 1809345"/>
+              <a:gd name="connsiteX0" fmla="*/ 0 w 1273985"/>
+              <a:gd name="connsiteY0" fmla="*/ 159248 h 2130358"/>
+              <a:gd name="connsiteX1" fmla="*/ 636993 w 1273985"/>
+              <a:gd name="connsiteY1" fmla="*/ 318496 h 2130358"/>
+              <a:gd name="connsiteX2" fmla="*/ 1273986 w 1273985"/>
+              <a:gd name="connsiteY2" fmla="*/ 159248 h 2130358"/>
+              <a:gd name="connsiteX3" fmla="*/ 1273985 w 1273985"/>
+              <a:gd name="connsiteY3" fmla="*/ 1971110 h 2130358"/>
+              <a:gd name="connsiteX4" fmla="*/ 636992 w 1273985"/>
               <a:gd name="connsiteY4" fmla="*/ 2130358 h 2130358"/>
-              <a:gd name="connsiteX5" fmla="*/ -1 w 1809345"/>
-              <a:gd name="connsiteY5" fmla="*/ 1904190 h 2130358"/>
-              <a:gd name="connsiteX6" fmla="*/ 0 w 1809345"/>
-              <a:gd name="connsiteY6" fmla="*/ 226168 h 2130358"/>
-              <a:gd name="connsiteX0" fmla="*/ 0 w 1809345"/>
-              <a:gd name="connsiteY0" fmla="*/ 226168 h 2130358"/>
-              <a:gd name="connsiteX1" fmla="*/ 904673 w 1809345"/>
+              <a:gd name="connsiteX5" fmla="*/ -1 w 1273985"/>
+              <a:gd name="connsiteY5" fmla="*/ 1971110 h 2130358"/>
+              <a:gd name="connsiteX6" fmla="*/ 0 w 1273985"/>
+              <a:gd name="connsiteY6" fmla="*/ 159248 h 2130358"/>
+              <a:gd name="connsiteX0" fmla="*/ 0 w 1273985"/>
+              <a:gd name="connsiteY0" fmla="*/ 159248 h 2130358"/>
+              <a:gd name="connsiteX1" fmla="*/ 636993 w 1273985"/>
               <a:gd name="connsiteY1" fmla="*/ 0 h 2130358"/>
-              <a:gd name="connsiteX2" fmla="*/ 1809346 w 1809345"/>
-              <a:gd name="connsiteY2" fmla="*/ 226168 h 2130358"/>
-              <a:gd name="connsiteX3" fmla="*/ 904673 w 1809345"/>
-              <a:gd name="connsiteY3" fmla="*/ 452336 h 2130358"/>
-              <a:gd name="connsiteX4" fmla="*/ 0 w 1809345"/>
-              <a:gd name="connsiteY4" fmla="*/ 226168 h 2130358"/>
-              <a:gd name="connsiteX0" fmla="*/ 1809345 w 1809345"/>
-              <a:gd name="connsiteY0" fmla="*/ 226168 h 2130358"/>
-              <a:gd name="connsiteX1" fmla="*/ 904672 w 1809345"/>
-              <a:gd name="connsiteY1" fmla="*/ 452336 h 2130358"/>
-              <a:gd name="connsiteX2" fmla="*/ -1 w 1809345"/>
-              <a:gd name="connsiteY2" fmla="*/ 226168 h 2130358"/>
-              <a:gd name="connsiteX3" fmla="*/ 904672 w 1809345"/>
+              <a:gd name="connsiteX2" fmla="*/ 1273986 w 1273985"/>
+              <a:gd name="connsiteY2" fmla="*/ 159248 h 2130358"/>
+              <a:gd name="connsiteX3" fmla="*/ 636993 w 1273985"/>
+              <a:gd name="connsiteY3" fmla="*/ 318496 h 2130358"/>
+              <a:gd name="connsiteX4" fmla="*/ 0 w 1273985"/>
+              <a:gd name="connsiteY4" fmla="*/ 159248 h 2130358"/>
+              <a:gd name="connsiteX0" fmla="*/ 1273985 w 1273985"/>
+              <a:gd name="connsiteY0" fmla="*/ 159248 h 2130358"/>
+              <a:gd name="connsiteX1" fmla="*/ 636992 w 1273985"/>
+              <a:gd name="connsiteY1" fmla="*/ 318496 h 2130358"/>
+              <a:gd name="connsiteX2" fmla="*/ -1 w 1273985"/>
+              <a:gd name="connsiteY2" fmla="*/ 159248 h 2130358"/>
+              <a:gd name="connsiteX3" fmla="*/ 636992 w 1273985"/>
               <a:gd name="connsiteY3" fmla="*/ 0 h 2130358"/>
-              <a:gd name="connsiteX4" fmla="*/ 1809345 w 1809345"/>
-              <a:gd name="connsiteY4" fmla="*/ 226168 h 2130358"/>
-              <a:gd name="connsiteX5" fmla="*/ 1809345 w 1809345"/>
-              <a:gd name="connsiteY5" fmla="*/ 1904190 h 2130358"/>
-              <a:gd name="connsiteX6" fmla="*/ 904672 w 1809345"/>
+              <a:gd name="connsiteX4" fmla="*/ 1273985 w 1273985"/>
+              <a:gd name="connsiteY4" fmla="*/ 159248 h 2130358"/>
+              <a:gd name="connsiteX5" fmla="*/ 1273985 w 1273985"/>
+              <a:gd name="connsiteY5" fmla="*/ 1971110 h 2130358"/>
+              <a:gd name="connsiteX6" fmla="*/ 636992 w 1273985"/>
               <a:gd name="connsiteY6" fmla="*/ 2130358 h 2130358"/>
-              <a:gd name="connsiteX7" fmla="*/ -1 w 1809345"/>
-              <a:gd name="connsiteY7" fmla="*/ 1904190 h 2130358"/>
-              <a:gd name="connsiteX8" fmla="*/ 0 w 1809345"/>
-              <a:gd name="connsiteY8" fmla="*/ 226168 h 2130358"/>
+              <a:gd name="connsiteX7" fmla="*/ -1 w 1273985"/>
+              <a:gd name="connsiteY7" fmla="*/ 1971110 h 2130358"/>
+              <a:gd name="connsiteX8" fmla="*/ 0 w 1273985"/>
+              <a:gd name="connsiteY8" fmla="*/ 159248 h 2130358"/>
             </a:gdLst>
             <a:ahLst/>
             <a:cxnLst>
@@ -4494,111 +4495,111 @@
             </a:cxnLst>
             <a:rect l="l" t="t" r="r" b="b"/>
             <a:pathLst>
-              <a:path w="1809345" h="2130358" stroke="0" extrusionOk="0">
+              <a:path w="1273985" h="2130358" stroke="0" extrusionOk="0">
                 <a:moveTo>
-                  <a:pt x="0" y="226168"/>
+                  <a:pt x="0" y="159248"/>
                 </a:moveTo>
                 <a:cubicBezTo>
-                  <a:pt x="41559" y="304999"/>
-                  <a:pt x="346616" y="455386"/>
-                  <a:pt x="904673" y="452336"/>
-                </a:cubicBezTo>
-                <a:cubicBezTo>
-                  <a:pt x="1409365" y="451702"/>
-                  <a:pt x="1798622" y="353229"/>
-                  <a:pt x="1809346" y="226168"/>
-                </a:cubicBezTo>
-                <a:cubicBezTo>
-                  <a:pt x="1792088" y="793166"/>
-                  <a:pt x="1879287" y="1427487"/>
-                  <a:pt x="1809345" y="1904190"/>
-                </a:cubicBezTo>
-                <a:cubicBezTo>
-                  <a:pt x="1819024" y="2046097"/>
-                  <a:pt x="1392573" y="2109618"/>
-                  <a:pt x="904672" y="2130358"/>
-                </a:cubicBezTo>
-                <a:cubicBezTo>
-                  <a:pt x="401904" y="2144777"/>
-                  <a:pt x="-4717" y="2031076"/>
-                  <a:pt x="-1" y="1904190"/>
-                </a:cubicBezTo>
-                <a:cubicBezTo>
-                  <a:pt x="13442" y="1378023"/>
-                  <a:pt x="9187" y="782265"/>
-                  <a:pt x="0" y="226168"/>
+                  <a:pt x="27718" y="216466"/>
+                  <a:pt x="235684" y="321080"/>
+                  <a:pt x="636993" y="318496"/>
+                </a:cubicBezTo>
+                <a:cubicBezTo>
+                  <a:pt x="1005287" y="316426"/>
+                  <a:pt x="1262069" y="249589"/>
+                  <a:pt x="1273986" y="159248"/>
+                </a:cubicBezTo>
+                <a:cubicBezTo>
+                  <a:pt x="1239861" y="778344"/>
+                  <a:pt x="1335447" y="1439774"/>
+                  <a:pt x="1273985" y="1971110"/>
+                </a:cubicBezTo>
+                <a:cubicBezTo>
+                  <a:pt x="1302477" y="2109099"/>
+                  <a:pt x="975765" y="2107334"/>
+                  <a:pt x="636992" y="2130358"/>
+                </a:cubicBezTo>
+                <a:cubicBezTo>
+                  <a:pt x="284948" y="2131471"/>
+                  <a:pt x="-13566" y="2064746"/>
+                  <a:pt x="-1" y="1971110"/>
+                </a:cubicBezTo>
+                <a:cubicBezTo>
+                  <a:pt x="33797" y="1450562"/>
+                  <a:pt x="15750" y="757640"/>
+                  <a:pt x="0" y="159248"/>
                 </a:cubicBezTo>
                 <a:close/>
               </a:path>
-              <a:path w="1809345" h="2130358" fill="lighten" stroke="0" extrusionOk="0">
+              <a:path w="1273985" h="2130358" fill="lighten" stroke="0" extrusionOk="0">
                 <a:moveTo>
-                  <a:pt x="0" y="226168"/>
+                  <a:pt x="0" y="159248"/>
                 </a:moveTo>
                 <a:cubicBezTo>
-                  <a:pt x="2844" y="113196"/>
-                  <a:pt x="363101" y="-14791"/>
-                  <a:pt x="904673" y="0"/>
-                </a:cubicBezTo>
-                <a:cubicBezTo>
-                  <a:pt x="1400387" y="-11472"/>
-                  <a:pt x="1819382" y="88138"/>
-                  <a:pt x="1809346" y="226168"/>
-                </a:cubicBezTo>
-                <a:cubicBezTo>
-                  <a:pt x="1851616" y="310735"/>
-                  <a:pt x="1381195" y="523315"/>
-                  <a:pt x="904673" y="452336"/>
-                </a:cubicBezTo>
-                <a:cubicBezTo>
-                  <a:pt x="404904" y="454466"/>
-                  <a:pt x="1829" y="369561"/>
-                  <a:pt x="0" y="226168"/>
+                  <a:pt x="12098" y="122065"/>
+                  <a:pt x="238949" y="-16309"/>
+                  <a:pt x="636993" y="0"/>
+                </a:cubicBezTo>
+                <a:cubicBezTo>
+                  <a:pt x="984254" y="-13279"/>
+                  <a:pt x="1277384" y="66855"/>
+                  <a:pt x="1273986" y="159248"/>
+                </a:cubicBezTo>
+                <a:cubicBezTo>
+                  <a:pt x="1281897" y="239648"/>
+                  <a:pt x="978186" y="351073"/>
+                  <a:pt x="636993" y="318496"/>
+                </a:cubicBezTo>
+                <a:cubicBezTo>
+                  <a:pt x="284178" y="334885"/>
+                  <a:pt x="1308" y="260419"/>
+                  <a:pt x="0" y="159248"/>
                 </a:cubicBezTo>
                 <a:close/>
               </a:path>
-              <a:path w="1809345" h="2130358" fill="none" extrusionOk="0">
+              <a:path w="1273985" h="2130358" fill="none" extrusionOk="0">
                 <a:moveTo>
-                  <a:pt x="1809345" y="226168"/>
+                  <a:pt x="1273985" y="159248"/>
                 </a:moveTo>
                 <a:cubicBezTo>
-                  <a:pt x="1820733" y="331447"/>
-                  <a:pt x="1392231" y="424781"/>
-                  <a:pt x="904672" y="452336"/>
-                </a:cubicBezTo>
-                <a:cubicBezTo>
-                  <a:pt x="411670" y="432788"/>
-                  <a:pt x="5237" y="338405"/>
-                  <a:pt x="-1" y="226168"/>
-                </a:cubicBezTo>
-                <a:cubicBezTo>
-                  <a:pt x="44185" y="134258"/>
-                  <a:pt x="411479" y="-2032"/>
-                  <a:pt x="904672" y="0"/>
-                </a:cubicBezTo>
-                <a:cubicBezTo>
-                  <a:pt x="1410950" y="5353"/>
-                  <a:pt x="1810453" y="105559"/>
-                  <a:pt x="1809345" y="226168"/>
-                </a:cubicBezTo>
-                <a:cubicBezTo>
-                  <a:pt x="1819357" y="514557"/>
-                  <a:pt x="1683544" y="1369021"/>
-                  <a:pt x="1809345" y="1904190"/>
-                </a:cubicBezTo>
-                <a:cubicBezTo>
-                  <a:pt x="1815426" y="2037325"/>
-                  <a:pt x="1332506" y="2154160"/>
-                  <a:pt x="904672" y="2130358"/>
-                </a:cubicBezTo>
-                <a:cubicBezTo>
-                  <a:pt x="400537" y="2136575"/>
-                  <a:pt x="19704" y="2014858"/>
-                  <a:pt x="-1" y="1904190"/>
-                </a:cubicBezTo>
-                <a:cubicBezTo>
-                  <a:pt x="20264" y="1287837"/>
-                  <a:pt x="15217" y="817741"/>
-                  <a:pt x="0" y="226168"/>
+                  <a:pt x="1293022" y="214383"/>
+                  <a:pt x="966780" y="268274"/>
+                  <a:pt x="636992" y="318496"/>
+                </a:cubicBezTo>
+                <a:cubicBezTo>
+                  <a:pt x="289363" y="306202"/>
+                  <a:pt x="3468" y="238805"/>
+                  <a:pt x="-1" y="159248"/>
+                </a:cubicBezTo>
+                <a:cubicBezTo>
+                  <a:pt x="14294" y="81974"/>
+                  <a:pt x="319795" y="-10914"/>
+                  <a:pt x="636992" y="0"/>
+                </a:cubicBezTo>
+                <a:cubicBezTo>
+                  <a:pt x="991406" y="2105"/>
+                  <a:pt x="1275307" y="76431"/>
+                  <a:pt x="1273985" y="159248"/>
+                </a:cubicBezTo>
+                <a:cubicBezTo>
+                  <a:pt x="1281441" y="1047995"/>
+                  <a:pt x="1167756" y="1600701"/>
+                  <a:pt x="1273985" y="1971110"/>
+                </a:cubicBezTo>
+                <a:cubicBezTo>
+                  <a:pt x="1295774" y="2088537"/>
+                  <a:pt x="955590" y="2141365"/>
+                  <a:pt x="636992" y="2130358"/>
+                </a:cubicBezTo>
+                <a:cubicBezTo>
+                  <a:pt x="275783" y="2143362"/>
+                  <a:pt x="3108" y="2056813"/>
+                  <a:pt x="-1" y="1971110"/>
+                </a:cubicBezTo>
+                <a:cubicBezTo>
+                  <a:pt x="18809" y="1314238"/>
+                  <a:pt x="18875" y="803182"/>
+                  <a:pt x="0" y="159248"/>
                 </a:cubicBezTo>
               </a:path>
             </a:pathLst>
@@ -4607,7 +4608,7 @@
           <a:ln>
             <a:extLst>
               <a:ext uri="{C807C97D-BFC1-408E-A445-0C87EB9F89A2}">
-                <ask:lineSketchStyleProps xmlns="" xmlns:ask="http://schemas.microsoft.com/office/drawing/2018/sketchyshapes" sd="278935163">
+                <ask:lineSketchStyleProps xmlns:ask="http://schemas.microsoft.com/office/drawing/2018/sketchyshapes" sd="278935163">
                   <a:prstGeom prst="can">
                     <a:avLst/>
                   </a:prstGeom>
@@ -4668,7 +4669,7 @@
         </p:blipFill>
         <p:spPr>
           <a:xfrm>
-            <a:off x="9446898" y="2673525"/>
+            <a:off x="9592813" y="2829176"/>
             <a:ext cx="2144472" cy="795241"/>
           </a:xfrm>
           <a:prstGeom prst="rect">
@@ -4690,7 +4691,7 @@
         </p:nvSpPr>
         <p:spPr>
           <a:xfrm>
-            <a:off x="9833968" y="1872336"/>
+            <a:off x="10058401" y="1853397"/>
             <a:ext cx="518091" cy="276999"/>
           </a:xfrm>
           <a:prstGeom prst="rect">
@@ -4801,25 +4802,13 @@
               <a:rPr lang="it-IT" sz="1200">
                 <a:latin typeface="Bahnschrift Light Condensed" panose="020B0502040204020203" pitchFamily="34" charset="0"/>
               </a:rPr>
-              <a:t>   </a:t>
-            </a:r>
-            <a:r>
-              <a:rPr lang="it-IT" sz="1200" smtClean="0">
-                <a:latin typeface="Bahnschrift Light Condensed" panose="020B0502040204020203" pitchFamily="34" charset="0"/>
-              </a:rPr>
-              <a:t>    </a:t>
-            </a:r>
-            <a:r>
-              <a:rPr lang="it-IT" sz="1050" b="1" smtClean="0">
-                <a:latin typeface="Bahnschrift Light Condensed" panose="020B0502040204020203" pitchFamily="34" charset="0"/>
-              </a:rPr>
-              <a:t>/</a:t>
+              <a:t>       </a:t>
             </a:r>
             <a:r>
               <a:rPr lang="it-IT" sz="1050" b="1">
                 <a:latin typeface="Bahnschrift Light Condensed" panose="020B0502040204020203" pitchFamily="34" charset="0"/>
               </a:rPr>
-              <a:t>gettimeseries</a:t>
+              <a:t>/gettimeseries</a:t>
             </a:r>
             <a:endParaRPr lang="it-IT" b="1">
               <a:latin typeface="Bahnschrift Light Condensed" panose="020B0502040204020203" pitchFamily="34" charset="0"/>
@@ -4976,7 +4965,7 @@
         <p:spPr>
           <a:xfrm flipH="1">
             <a:off x="9007815" y="2154117"/>
-            <a:ext cx="881977" cy="0"/>
+            <a:ext cx="1050586" cy="0"/>
           </a:xfrm>
           <a:prstGeom prst="line">
             <a:avLst/>
@@ -5020,7 +5009,7 @@
         </p:nvSpPr>
         <p:spPr>
           <a:xfrm>
-            <a:off x="9347071" y="2118984"/>
+            <a:off x="9599992" y="2118984"/>
             <a:ext cx="511679" cy="215444"/>
           </a:xfrm>
           <a:prstGeom prst="rect">
@@ -5068,13 +5057,13 @@
             <a:gdLst>
               <a:gd name="connsiteX0" fmla="*/ 0 w 894080"/>
               <a:gd name="connsiteY0" fmla="*/ 0 h 169993"/>
-              <a:gd name="connsiteX1" fmla="*/ 455981 w 894080"/>
+              <a:gd name="connsiteX1" fmla="*/ 420218 w 894080"/>
               <a:gd name="connsiteY1" fmla="*/ 0 h 169993"/>
               <a:gd name="connsiteX2" fmla="*/ 894080 w 894080"/>
               <a:gd name="connsiteY2" fmla="*/ 0 h 169993"/>
               <a:gd name="connsiteX3" fmla="*/ 894080 w 894080"/>
               <a:gd name="connsiteY3" fmla="*/ 169993 h 169993"/>
-              <a:gd name="connsiteX4" fmla="*/ 447040 w 894080"/>
+              <a:gd name="connsiteX4" fmla="*/ 464922 w 894080"/>
               <a:gd name="connsiteY4" fmla="*/ 169993 h 169993"/>
               <a:gd name="connsiteX5" fmla="*/ 0 w 894080"/>
               <a:gd name="connsiteY5" fmla="*/ 169993 h 169993"/>
@@ -5107,7 +5096,43 @@
             </a:cxnLst>
             <a:rect l="l" t="t" r="r" b="b"/>
             <a:pathLst>
-              <a:path w="894080" h="169993" extrusionOk="0">
+              <a:path w="894080" h="169993" fill="none" extrusionOk="0">
+                <a:moveTo>
+                  <a:pt x="0" y="0"/>
+                </a:moveTo>
+                <a:cubicBezTo>
+                  <a:pt x="123420" y="8948"/>
+                  <a:pt x="268336" y="10215"/>
+                  <a:pt x="420218" y="0"/>
+                </a:cubicBezTo>
+                <a:cubicBezTo>
+                  <a:pt x="572100" y="-10215"/>
+                  <a:pt x="662119" y="-19408"/>
+                  <a:pt x="894080" y="0"/>
+                </a:cubicBezTo>
+                <a:cubicBezTo>
+                  <a:pt x="889653" y="78804"/>
+                  <a:pt x="895597" y="99518"/>
+                  <a:pt x="894080" y="169993"/>
+                </a:cubicBezTo>
+                <a:cubicBezTo>
+                  <a:pt x="804932" y="154185"/>
+                  <a:pt x="561156" y="183375"/>
+                  <a:pt x="464922" y="169993"/>
+                </a:cubicBezTo>
+                <a:cubicBezTo>
+                  <a:pt x="368688" y="156611"/>
+                  <a:pt x="148189" y="154479"/>
+                  <a:pt x="0" y="169993"/>
+                </a:cubicBezTo>
+                <a:cubicBezTo>
+                  <a:pt x="-4347" y="129826"/>
+                  <a:pt x="-1196" y="41927"/>
+                  <a:pt x="0" y="0"/>
+                </a:cubicBezTo>
+                <a:close/>
+              </a:path>
+              <a:path w="894080" h="169993" stroke="0" extrusionOk="0">
                 <a:moveTo>
                   <a:pt x="0" y="0"/>
                 </a:moveTo>
@@ -5151,7 +5176,7 @@
           <a:ln w="9525">
             <a:extLst>
               <a:ext uri="{C807C97D-BFC1-408E-A445-0C87EB9F89A2}">
-                <ask:lineSketchStyleProps xmlns="" xmlns:ask="http://schemas.microsoft.com/office/drawing/2018/sketchyshapes" sd="1725041551">
+                <ask:lineSketchStyleProps xmlns:ask="http://schemas.microsoft.com/office/drawing/2018/sketchyshapes" sd="1725041551">
                   <a:prstGeom prst="rect">
                     <a:avLst/>
                   </a:prstGeom>
@@ -5389,7 +5414,7 @@
           <a:ln w="9525">
             <a:extLst>
               <a:ext uri="{C807C97D-BFC1-408E-A445-0C87EB9F89A2}">
-                <ask:lineSketchStyleProps xmlns="" xmlns:ask="http://schemas.microsoft.com/office/drawing/2018/sketchyshapes" sd="1725041551">
+                <ask:lineSketchStyleProps xmlns:ask="http://schemas.microsoft.com/office/drawing/2018/sketchyshapes" sd="1725041551">
                   <a:prstGeom prst="rect">
                     <a:avLst/>
                   </a:prstGeom>
@@ -5645,7 +5670,7 @@
           <a:ln w="9525">
             <a:extLst>
               <a:ext uri="{C807C97D-BFC1-408E-A445-0C87EB9F89A2}">
-                <ask:lineSketchStyleProps xmlns="" xmlns:ask="http://schemas.microsoft.com/office/drawing/2018/sketchyshapes" sd="1725041551">
+                <ask:lineSketchStyleProps xmlns:ask="http://schemas.microsoft.com/office/drawing/2018/sketchyshapes" sd="1725041551">
                   <a:prstGeom prst="rect">
                     <a:avLst/>
                   </a:prstGeom>
@@ -5918,7 +5943,7 @@
           <a:ln w="9525">
             <a:extLst>
               <a:ext uri="{C807C97D-BFC1-408E-A445-0C87EB9F89A2}">
-                <ask:lineSketchStyleProps xmlns="" xmlns:ask="http://schemas.microsoft.com/office/drawing/2018/sketchyshapes" sd="2244232375">
+                <ask:lineSketchStyleProps xmlns:ask="http://schemas.microsoft.com/office/drawing/2018/sketchyshapes" sd="2244232375">
                   <a:prstGeom prst="rect">
                     <a:avLst/>
                   </a:prstGeom>
@@ -6028,31 +6053,27 @@
               <a:avLst/>
               <a:gdLst>
                 <a:gd name="connsiteX0" fmla="*/ 0 w 2242673"/>
-                <a:gd name="connsiteY0" fmla="*/ 0 h 867704"/>
-                <a:gd name="connsiteX1" fmla="*/ 560668 w 2242673"/>
-                <a:gd name="connsiteY1" fmla="*/ 0 h 867704"/>
-                <a:gd name="connsiteX2" fmla="*/ 1121337 w 2242673"/>
-                <a:gd name="connsiteY2" fmla="*/ 0 h 867704"/>
-                <a:gd name="connsiteX3" fmla="*/ 1726858 w 2242673"/>
-                <a:gd name="connsiteY3" fmla="*/ 0 h 867704"/>
+                <a:gd name="connsiteY0" fmla="*/ 0 h 581110"/>
+                <a:gd name="connsiteX1" fmla="*/ 605522 w 2242673"/>
+                <a:gd name="connsiteY1" fmla="*/ 0 h 581110"/>
+                <a:gd name="connsiteX2" fmla="*/ 1211043 w 2242673"/>
+                <a:gd name="connsiteY2" fmla="*/ 0 h 581110"/>
+                <a:gd name="connsiteX3" fmla="*/ 1704431 w 2242673"/>
+                <a:gd name="connsiteY3" fmla="*/ 0 h 581110"/>
                 <a:gd name="connsiteX4" fmla="*/ 2242673 w 2242673"/>
-                <a:gd name="connsiteY4" fmla="*/ 0 h 867704"/>
+                <a:gd name="connsiteY4" fmla="*/ 0 h 581110"/>
                 <a:gd name="connsiteX5" fmla="*/ 2242673 w 2242673"/>
-                <a:gd name="connsiteY5" fmla="*/ 425175 h 867704"/>
-                <a:gd name="connsiteX6" fmla="*/ 2242673 w 2242673"/>
-                <a:gd name="connsiteY6" fmla="*/ 867704 h 867704"/>
-                <a:gd name="connsiteX7" fmla="*/ 1682005 w 2242673"/>
-                <a:gd name="connsiteY7" fmla="*/ 867704 h 867704"/>
-                <a:gd name="connsiteX8" fmla="*/ 1166190 w 2242673"/>
-                <a:gd name="connsiteY8" fmla="*/ 867704 h 867704"/>
-                <a:gd name="connsiteX9" fmla="*/ 583095 w 2242673"/>
-                <a:gd name="connsiteY9" fmla="*/ 867704 h 867704"/>
+                <a:gd name="connsiteY5" fmla="*/ 581110 h 581110"/>
+                <a:gd name="connsiteX6" fmla="*/ 1749285 w 2242673"/>
+                <a:gd name="connsiteY6" fmla="*/ 581110 h 581110"/>
+                <a:gd name="connsiteX7" fmla="*/ 1255897 w 2242673"/>
+                <a:gd name="connsiteY7" fmla="*/ 581110 h 581110"/>
+                <a:gd name="connsiteX8" fmla="*/ 695229 w 2242673"/>
+                <a:gd name="connsiteY8" fmla="*/ 581110 h 581110"/>
+                <a:gd name="connsiteX9" fmla="*/ 0 w 2242673"/>
+                <a:gd name="connsiteY9" fmla="*/ 581110 h 581110"/>
                 <a:gd name="connsiteX10" fmla="*/ 0 w 2242673"/>
-                <a:gd name="connsiteY10" fmla="*/ 867704 h 867704"/>
-                <a:gd name="connsiteX11" fmla="*/ 0 w 2242673"/>
-                <a:gd name="connsiteY11" fmla="*/ 451206 h 867704"/>
-                <a:gd name="connsiteX12" fmla="*/ 0 w 2242673"/>
-                <a:gd name="connsiteY12" fmla="*/ 0 h 867704"/>
+                <a:gd name="connsiteY10" fmla="*/ 0 h 581110"/>
               </a:gdLst>
               <a:ahLst/>
               <a:cxnLst>
@@ -6089,82 +6110,66 @@
                 <a:cxn ang="0">
                   <a:pos x="connsiteX10" y="connsiteY10"/>
                 </a:cxn>
-                <a:cxn ang="0">
-                  <a:pos x="connsiteX11" y="connsiteY11"/>
-                </a:cxn>
-                <a:cxn ang="0">
-                  <a:pos x="connsiteX12" y="connsiteY12"/>
-                </a:cxn>
               </a:cxnLst>
               <a:rect l="l" t="t" r="r" b="b"/>
               <a:pathLst>
-                <a:path w="2242673" h="867704" fill="none" extrusionOk="0">
+                <a:path w="2242673" h="581110" fill="none" extrusionOk="0">
                   <a:moveTo>
                     <a:pt x="0" y="0"/>
                   </a:moveTo>
                   <a:cubicBezTo>
-                    <a:pt x="235854" y="12919"/>
-                    <a:pt x="336399" y="-11571"/>
-                    <a:pt x="560668" y="0"/>
+                    <a:pt x="271175" y="26416"/>
+                    <a:pt x="445617" y="-2552"/>
+                    <a:pt x="605522" y="0"/>
                   </a:cubicBezTo>
                   <a:cubicBezTo>
-                    <a:pt x="784937" y="11571"/>
-                    <a:pt x="891064" y="-18622"/>
-                    <a:pt x="1121337" y="0"/>
+                    <a:pt x="765427" y="2552"/>
+                    <a:pt x="1048727" y="-9591"/>
+                    <a:pt x="1211043" y="0"/>
                   </a:cubicBezTo>
                   <a:cubicBezTo>
-                    <a:pt x="1351610" y="18622"/>
-                    <a:pt x="1436542" y="8585"/>
-                    <a:pt x="1726858" y="0"/>
+                    <a:pt x="1373359" y="9591"/>
+                    <a:pt x="1577875" y="17364"/>
+                    <a:pt x="1704431" y="0"/>
                   </a:cubicBezTo>
                   <a:cubicBezTo>
-                    <a:pt x="2017174" y="-8585"/>
-                    <a:pt x="2018079" y="-21759"/>
+                    <a:pt x="1830987" y="-17364"/>
+                    <a:pt x="2064556" y="-13737"/>
                     <a:pt x="2242673" y="0"/>
                   </a:cubicBezTo>
                   <a:cubicBezTo>
-                    <a:pt x="2227610" y="112293"/>
-                    <a:pt x="2258310" y="304722"/>
-                    <a:pt x="2242673" y="425175"/>
+                    <a:pt x="2234508" y="143183"/>
+                    <a:pt x="2233273" y="434307"/>
+                    <a:pt x="2242673" y="581110"/>
                   </a:cubicBezTo>
                   <a:cubicBezTo>
-                    <a:pt x="2227036" y="545629"/>
-                    <a:pt x="2226864" y="680613"/>
-                    <a:pt x="2242673" y="867704"/>
+                    <a:pt x="2088036" y="603017"/>
+                    <a:pt x="1907952" y="587478"/>
+                    <a:pt x="1749285" y="581110"/>
                   </a:cubicBezTo>
                   <a:cubicBezTo>
-                    <a:pt x="2091189" y="872517"/>
-                    <a:pt x="1869055" y="841099"/>
-                    <a:pt x="1682005" y="867704"/>
+                    <a:pt x="1590618" y="574742"/>
+                    <a:pt x="1464598" y="558617"/>
+                    <a:pt x="1255897" y="581110"/>
                   </a:cubicBezTo>
                   <a:cubicBezTo>
-                    <a:pt x="1494955" y="894309"/>
-                    <a:pt x="1383911" y="852613"/>
-                    <a:pt x="1166190" y="867704"/>
+                    <a:pt x="1047196" y="603603"/>
+                    <a:pt x="850654" y="563195"/>
+                    <a:pt x="695229" y="581110"/>
                   </a:cubicBezTo>
                   <a:cubicBezTo>
-                    <a:pt x="948470" y="882795"/>
-                    <a:pt x="714606" y="864280"/>
-                    <a:pt x="583095" y="867704"/>
+                    <a:pt x="539804" y="599025"/>
+                    <a:pt x="199873" y="570994"/>
+                    <a:pt x="0" y="581110"/>
                   </a:cubicBezTo>
                   <a:cubicBezTo>
-                    <a:pt x="451585" y="871128"/>
-                    <a:pt x="269680" y="861036"/>
-                    <a:pt x="0" y="867704"/>
-                  </a:cubicBezTo>
-                  <a:cubicBezTo>
-                    <a:pt x="491" y="716538"/>
-                    <a:pt x="18850" y="646532"/>
-                    <a:pt x="0" y="451206"/>
-                  </a:cubicBezTo>
-                  <a:cubicBezTo>
-                    <a:pt x="-18850" y="255880"/>
-                    <a:pt x="5201" y="93585"/>
+                    <a:pt x="6924" y="350783"/>
+                    <a:pt x="-27552" y="177721"/>
                     <a:pt x="0" y="0"/>
                   </a:cubicBezTo>
                   <a:close/>
                 </a:path>
-                <a:path w="2242673" h="867704" stroke="0" extrusionOk="0">
+                <a:path w="2242673" h="581110" stroke="0" extrusionOk="0">
                   <a:moveTo>
                     <a:pt x="0" y="0"/>
                   </a:moveTo>
@@ -6189,43 +6194,33 @@
                     <a:pt x="2242673" y="0"/>
                   </a:cubicBezTo>
                   <a:cubicBezTo>
-                    <a:pt x="2223920" y="161774"/>
-                    <a:pt x="2226481" y="245512"/>
-                    <a:pt x="2242673" y="451206"/>
+                    <a:pt x="2238664" y="123264"/>
+                    <a:pt x="2236584" y="446056"/>
+                    <a:pt x="2242673" y="581110"/>
                   </a:cubicBezTo>
                   <a:cubicBezTo>
-                    <a:pt x="2258865" y="656900"/>
-                    <a:pt x="2247905" y="730374"/>
-                    <a:pt x="2242673" y="867704"/>
+                    <a:pt x="2023607" y="583014"/>
+                    <a:pt x="1929762" y="592384"/>
+                    <a:pt x="1749285" y="581110"/>
                   </a:cubicBezTo>
                   <a:cubicBezTo>
-                    <a:pt x="2045926" y="857665"/>
-                    <a:pt x="1919443" y="853495"/>
-                    <a:pt x="1749285" y="867704"/>
+                    <a:pt x="1568808" y="569836"/>
+                    <a:pt x="1426055" y="566901"/>
+                    <a:pt x="1255897" y="581110"/>
                   </a:cubicBezTo>
                   <a:cubicBezTo>
-                    <a:pt x="1579127" y="881913"/>
-                    <a:pt x="1313771" y="878753"/>
-                    <a:pt x="1166190" y="867704"/>
+                    <a:pt x="1085739" y="595319"/>
+                    <a:pt x="820383" y="592159"/>
+                    <a:pt x="672802" y="581110"/>
                   </a:cubicBezTo>
                   <a:cubicBezTo>
-                    <a:pt x="1018609" y="856655"/>
-                    <a:pt x="764009" y="849830"/>
-                    <a:pt x="605522" y="867704"/>
+                    <a:pt x="525221" y="570061"/>
+                    <a:pt x="315094" y="591449"/>
+                    <a:pt x="0" y="581110"/>
                   </a:cubicBezTo>
                   <a:cubicBezTo>
-                    <a:pt x="447035" y="885578"/>
-                    <a:pt x="169398" y="895171"/>
-                    <a:pt x="0" y="867704"/>
-                  </a:cubicBezTo>
-                  <a:cubicBezTo>
-                    <a:pt x="8418" y="679053"/>
-                    <a:pt x="-4119" y="640234"/>
-                    <a:pt x="0" y="433852"/>
-                  </a:cubicBezTo>
-                  <a:cubicBezTo>
-                    <a:pt x="4119" y="227470"/>
-                    <a:pt x="-1065" y="148264"/>
+                    <a:pt x="22649" y="358255"/>
+                    <a:pt x="-25567" y="149682"/>
                     <a:pt x="0" y="0"/>
                   </a:cubicBezTo>
                   <a:close/>
@@ -6241,7 +6236,7 @@
             <a:ln>
               <a:extLst>
                 <a:ext uri="{C807C97D-BFC1-408E-A445-0C87EB9F89A2}">
-                  <ask:lineSketchStyleProps xmlns="" xmlns:ask="http://schemas.microsoft.com/office/drawing/2018/sketchyshapes" sd="2244232375">
+                  <ask:lineSketchStyleProps xmlns:ask="http://schemas.microsoft.com/office/drawing/2018/sketchyshapes" sd="2244232375">
                     <a:prstGeom prst="rect">
                       <a:avLst/>
                     </a:prstGeom>
@@ -6301,27 +6296,27 @@
               <a:avLst/>
               <a:gdLst>
                 <a:gd name="connsiteX0" fmla="*/ 0 w 2242673"/>
-                <a:gd name="connsiteY0" fmla="*/ 0 h 290405"/>
+                <a:gd name="connsiteY0" fmla="*/ 0 h 194487"/>
                 <a:gd name="connsiteX1" fmla="*/ 605522 w 2242673"/>
-                <a:gd name="connsiteY1" fmla="*/ 0 h 290405"/>
+                <a:gd name="connsiteY1" fmla="*/ 0 h 194487"/>
                 <a:gd name="connsiteX2" fmla="*/ 1211043 w 2242673"/>
-                <a:gd name="connsiteY2" fmla="*/ 0 h 290405"/>
+                <a:gd name="connsiteY2" fmla="*/ 0 h 194487"/>
                 <a:gd name="connsiteX3" fmla="*/ 1704431 w 2242673"/>
-                <a:gd name="connsiteY3" fmla="*/ 0 h 290405"/>
+                <a:gd name="connsiteY3" fmla="*/ 0 h 194487"/>
                 <a:gd name="connsiteX4" fmla="*/ 2242673 w 2242673"/>
-                <a:gd name="connsiteY4" fmla="*/ 0 h 290405"/>
+                <a:gd name="connsiteY4" fmla="*/ 0 h 194487"/>
                 <a:gd name="connsiteX5" fmla="*/ 2242673 w 2242673"/>
-                <a:gd name="connsiteY5" fmla="*/ 290405 h 290405"/>
+                <a:gd name="connsiteY5" fmla="*/ 194487 h 194487"/>
                 <a:gd name="connsiteX6" fmla="*/ 1749285 w 2242673"/>
-                <a:gd name="connsiteY6" fmla="*/ 290405 h 290405"/>
+                <a:gd name="connsiteY6" fmla="*/ 194487 h 194487"/>
                 <a:gd name="connsiteX7" fmla="*/ 1255897 w 2242673"/>
-                <a:gd name="connsiteY7" fmla="*/ 290405 h 290405"/>
+                <a:gd name="connsiteY7" fmla="*/ 194487 h 194487"/>
                 <a:gd name="connsiteX8" fmla="*/ 695229 w 2242673"/>
-                <a:gd name="connsiteY8" fmla="*/ 290405 h 290405"/>
+                <a:gd name="connsiteY8" fmla="*/ 194487 h 194487"/>
                 <a:gd name="connsiteX9" fmla="*/ 0 w 2242673"/>
-                <a:gd name="connsiteY9" fmla="*/ 290405 h 290405"/>
+                <a:gd name="connsiteY9" fmla="*/ 194487 h 194487"/>
                 <a:gd name="connsiteX10" fmla="*/ 0 w 2242673"/>
-                <a:gd name="connsiteY10" fmla="*/ 0 h 290405"/>
+                <a:gd name="connsiteY10" fmla="*/ 0 h 194487"/>
               </a:gdLst>
               <a:ahLst/>
               <a:cxnLst>
@@ -6361,7 +6356,7 @@
               </a:cxnLst>
               <a:rect l="l" t="t" r="r" b="b"/>
               <a:pathLst>
-                <a:path w="2242673" h="290405" fill="none" extrusionOk="0">
+                <a:path w="2242673" h="194487" fill="none" extrusionOk="0">
                   <a:moveTo>
                     <a:pt x="0" y="0"/>
                   </a:moveTo>
@@ -6386,38 +6381,38 @@
                     <a:pt x="2242673" y="0"/>
                   </a:cubicBezTo>
                   <a:cubicBezTo>
-                    <a:pt x="2254654" y="61419"/>
-                    <a:pt x="2250348" y="146712"/>
-                    <a:pt x="2242673" y="290405"/>
+                    <a:pt x="2233205" y="66923"/>
+                    <a:pt x="2247577" y="150080"/>
+                    <a:pt x="2242673" y="194487"/>
                   </a:cubicBezTo>
                   <a:cubicBezTo>
-                    <a:pt x="2088036" y="312312"/>
-                    <a:pt x="1907952" y="296773"/>
-                    <a:pt x="1749285" y="290405"/>
+                    <a:pt x="2088036" y="216394"/>
+                    <a:pt x="1907952" y="200855"/>
+                    <a:pt x="1749285" y="194487"/>
                   </a:cubicBezTo>
                   <a:cubicBezTo>
-                    <a:pt x="1590618" y="284037"/>
-                    <a:pt x="1464598" y="267912"/>
-                    <a:pt x="1255897" y="290405"/>
+                    <a:pt x="1590618" y="188119"/>
+                    <a:pt x="1464598" y="171994"/>
+                    <a:pt x="1255897" y="194487"/>
                   </a:cubicBezTo>
                   <a:cubicBezTo>
-                    <a:pt x="1047196" y="312898"/>
-                    <a:pt x="850654" y="272490"/>
-                    <a:pt x="695229" y="290405"/>
+                    <a:pt x="1047196" y="216980"/>
+                    <a:pt x="850654" y="176572"/>
+                    <a:pt x="695229" y="194487"/>
                   </a:cubicBezTo>
                   <a:cubicBezTo>
-                    <a:pt x="539804" y="308320"/>
-                    <a:pt x="199873" y="280289"/>
-                    <a:pt x="0" y="290405"/>
+                    <a:pt x="539804" y="212402"/>
+                    <a:pt x="199873" y="184371"/>
+                    <a:pt x="0" y="194487"/>
                   </a:cubicBezTo>
                   <a:cubicBezTo>
-                    <a:pt x="-5665" y="192962"/>
-                    <a:pt x="-2990" y="73198"/>
+                    <a:pt x="-8340" y="132081"/>
+                    <a:pt x="-8509" y="83835"/>
                     <a:pt x="0" y="0"/>
                   </a:cubicBezTo>
                   <a:close/>
                 </a:path>
-                <a:path w="2242673" h="290405" stroke="0" extrusionOk="0">
+                <a:path w="2242673" h="194487" stroke="0" extrusionOk="0">
                   <a:moveTo>
                     <a:pt x="0" y="0"/>
                   </a:moveTo>
@@ -6442,33 +6437,33 @@
                     <a:pt x="2242673" y="0"/>
                   </a:cubicBezTo>
                   <a:cubicBezTo>
-                    <a:pt x="2249305" y="103118"/>
-                    <a:pt x="2239484" y="191616"/>
-                    <a:pt x="2242673" y="290405"/>
+                    <a:pt x="2240171" y="74748"/>
+                    <a:pt x="2252016" y="139611"/>
+                    <a:pt x="2242673" y="194487"/>
                   </a:cubicBezTo>
                   <a:cubicBezTo>
-                    <a:pt x="2023607" y="292309"/>
-                    <a:pt x="1929762" y="301679"/>
-                    <a:pt x="1749285" y="290405"/>
+                    <a:pt x="2023607" y="196391"/>
+                    <a:pt x="1929762" y="205761"/>
+                    <a:pt x="1749285" y="194487"/>
                   </a:cubicBezTo>
                   <a:cubicBezTo>
-                    <a:pt x="1568808" y="279131"/>
-                    <a:pt x="1426055" y="276196"/>
-                    <a:pt x="1255897" y="290405"/>
+                    <a:pt x="1568808" y="183213"/>
+                    <a:pt x="1426055" y="180278"/>
+                    <a:pt x="1255897" y="194487"/>
                   </a:cubicBezTo>
                   <a:cubicBezTo>
-                    <a:pt x="1085739" y="304614"/>
-                    <a:pt x="820383" y="301454"/>
-                    <a:pt x="672802" y="290405"/>
+                    <a:pt x="1085739" y="208696"/>
+                    <a:pt x="820383" y="205536"/>
+                    <a:pt x="672802" y="194487"/>
                   </a:cubicBezTo>
                   <a:cubicBezTo>
-                    <a:pt x="525221" y="279356"/>
-                    <a:pt x="315094" y="300744"/>
-                    <a:pt x="0" y="290405"/>
+                    <a:pt x="525221" y="183438"/>
+                    <a:pt x="315094" y="204826"/>
+                    <a:pt x="0" y="194487"/>
                   </a:cubicBezTo>
                   <a:cubicBezTo>
-                    <a:pt x="-10246" y="178167"/>
-                    <a:pt x="7882" y="67041"/>
+                    <a:pt x="-2413" y="137438"/>
+                    <a:pt x="-1830" y="68668"/>
                     <a:pt x="0" y="0"/>
                   </a:cubicBezTo>
                   <a:close/>
@@ -6484,7 +6479,7 @@
             <a:ln>
               <a:extLst>
                 <a:ext uri="{C807C97D-BFC1-408E-A445-0C87EB9F89A2}">
-                  <ask:lineSketchStyleProps xmlns="" xmlns:ask="http://schemas.microsoft.com/office/drawing/2018/sketchyshapes" sd="2244232375">
+                  <ask:lineSketchStyleProps xmlns:ask="http://schemas.microsoft.com/office/drawing/2018/sketchyshapes" sd="2244232375">
                     <a:prstGeom prst="rect">
                       <a:avLst/>
                     </a:prstGeom>
@@ -6574,25 +6569,13 @@
               <a:rPr lang="it-IT" sz="1200">
                 <a:latin typeface="Bahnschrift Light Condensed" panose="020B0502040204020203" pitchFamily="34" charset="0"/>
               </a:rPr>
-              <a:t>   </a:t>
-            </a:r>
-            <a:r>
-              <a:rPr lang="it-IT" sz="1200" smtClean="0">
-                <a:latin typeface="Bahnschrift Light Condensed" panose="020B0502040204020203" pitchFamily="34" charset="0"/>
-              </a:rPr>
-              <a:t>   </a:t>
-            </a:r>
-            <a:r>
-              <a:rPr lang="it-IT" sz="1050" b="1" smtClean="0">
-                <a:latin typeface="Bahnschrift Light Condensed" panose="020B0502040204020203" pitchFamily="34" charset="0"/>
-              </a:rPr>
-              <a:t>/</a:t>
+              <a:t>      </a:t>
             </a:r>
             <a:r>
               <a:rPr lang="it-IT" sz="1050" b="1">
                 <a:latin typeface="Bahnschrift Light Condensed" panose="020B0502040204020203" pitchFamily="34" charset="0"/>
               </a:rPr>
-              <a:t>consumers</a:t>
+              <a:t>/consumers</a:t>
             </a:r>
             <a:endParaRPr lang="it-IT" b="1">
               <a:latin typeface="Bahnschrift Light Condensed" panose="020B0502040204020203" pitchFamily="34" charset="0"/>
@@ -6886,321 +6869,300 @@
           </a:p>
         </p:txBody>
       </p:sp>
-      <p:grpSp>
-        <p:nvGrpSpPr>
-          <p:cNvPr id="93" name="Gruppo 92">
-            <a:extLst>
-              <a:ext uri="{FF2B5EF4-FFF2-40B4-BE49-F238E27FC236}">
-                <a16:creationId xmlns:a16="http://schemas.microsoft.com/office/drawing/2014/main" id="{D5FD9FDE-DBE6-952C-FECF-43C31ABF5F8C}"/>
-              </a:ext>
-            </a:extLst>
-          </p:cNvPr>
-          <p:cNvGrpSpPr/>
+      <p:sp>
+        <p:nvSpPr>
+          <p:cNvPr id="91" name="Cilindro 90">
+            <a:extLst>
+              <a:ext uri="{FF2B5EF4-FFF2-40B4-BE49-F238E27FC236}">
+                <a16:creationId xmlns:a16="http://schemas.microsoft.com/office/drawing/2014/main" id="{20C0EB03-4A53-A757-DF1D-8E9797EDB1DC}"/>
+              </a:ext>
+            </a:extLst>
+          </p:cNvPr>
+          <p:cNvSpPr/>
           <p:nvPr/>
-        </p:nvGrpSpPr>
-        <p:grpSpPr>
+        </p:nvSpPr>
+        <p:spPr>
           <a:xfrm>
             <a:off x="7039007" y="2212735"/>
-            <a:ext cx="990168" cy="1126539"/>
-            <a:chOff x="7041780" y="2643742"/>
-            <a:chExt cx="990168" cy="1126539"/>
+            <a:ext cx="758741" cy="928307"/>
           </a:xfrm>
-        </p:grpSpPr>
-        <p:sp>
-          <p:nvSpPr>
-            <p:cNvPr id="91" name="Cilindro 90">
-              <a:extLst>
-                <a:ext uri="{FF2B5EF4-FFF2-40B4-BE49-F238E27FC236}">
-                  <a16:creationId xmlns:a16="http://schemas.microsoft.com/office/drawing/2014/main" id="{20C0EB03-4A53-A757-DF1D-8E9797EDB1DC}"/>
-                </a:ext>
-              </a:extLst>
-            </p:cNvPr>
-            <p:cNvSpPr/>
-            <p:nvPr/>
-          </p:nvSpPr>
-          <p:spPr>
-            <a:xfrm>
-              <a:off x="7041780" y="2643742"/>
-              <a:ext cx="990168" cy="1040093"/>
-            </a:xfrm>
-            <a:custGeom>
-              <a:avLst/>
-              <a:gdLst>
-                <a:gd name="connsiteX0" fmla="*/ 0 w 990168"/>
-                <a:gd name="connsiteY0" fmla="*/ 123771 h 1040093"/>
-                <a:gd name="connsiteX1" fmla="*/ 495084 w 990168"/>
-                <a:gd name="connsiteY1" fmla="*/ 247542 h 1040093"/>
-                <a:gd name="connsiteX2" fmla="*/ 990168 w 990168"/>
-                <a:gd name="connsiteY2" fmla="*/ 123771 h 1040093"/>
-                <a:gd name="connsiteX3" fmla="*/ 990168 w 990168"/>
-                <a:gd name="connsiteY3" fmla="*/ 916322 h 1040093"/>
-                <a:gd name="connsiteX4" fmla="*/ 495084 w 990168"/>
-                <a:gd name="connsiteY4" fmla="*/ 1040093 h 1040093"/>
-                <a:gd name="connsiteX5" fmla="*/ 0 w 990168"/>
-                <a:gd name="connsiteY5" fmla="*/ 916322 h 1040093"/>
-                <a:gd name="connsiteX6" fmla="*/ 0 w 990168"/>
-                <a:gd name="connsiteY6" fmla="*/ 123771 h 1040093"/>
-                <a:gd name="connsiteX0" fmla="*/ 0 w 990168"/>
-                <a:gd name="connsiteY0" fmla="*/ 123771 h 1040093"/>
-                <a:gd name="connsiteX1" fmla="*/ 495084 w 990168"/>
-                <a:gd name="connsiteY1" fmla="*/ 0 h 1040093"/>
-                <a:gd name="connsiteX2" fmla="*/ 990168 w 990168"/>
-                <a:gd name="connsiteY2" fmla="*/ 123771 h 1040093"/>
-                <a:gd name="connsiteX3" fmla="*/ 495084 w 990168"/>
-                <a:gd name="connsiteY3" fmla="*/ 247542 h 1040093"/>
-                <a:gd name="connsiteX4" fmla="*/ 0 w 990168"/>
-                <a:gd name="connsiteY4" fmla="*/ 123771 h 1040093"/>
-                <a:gd name="connsiteX0" fmla="*/ 990168 w 990168"/>
-                <a:gd name="connsiteY0" fmla="*/ 123771 h 1040093"/>
-                <a:gd name="connsiteX1" fmla="*/ 495084 w 990168"/>
-                <a:gd name="connsiteY1" fmla="*/ 247542 h 1040093"/>
-                <a:gd name="connsiteX2" fmla="*/ 0 w 990168"/>
-                <a:gd name="connsiteY2" fmla="*/ 123771 h 1040093"/>
-                <a:gd name="connsiteX3" fmla="*/ 495084 w 990168"/>
-                <a:gd name="connsiteY3" fmla="*/ 0 h 1040093"/>
-                <a:gd name="connsiteX4" fmla="*/ 990168 w 990168"/>
-                <a:gd name="connsiteY4" fmla="*/ 123771 h 1040093"/>
-                <a:gd name="connsiteX5" fmla="*/ 990168 w 990168"/>
-                <a:gd name="connsiteY5" fmla="*/ 916322 h 1040093"/>
-                <a:gd name="connsiteX6" fmla="*/ 495084 w 990168"/>
-                <a:gd name="connsiteY6" fmla="*/ 1040093 h 1040093"/>
-                <a:gd name="connsiteX7" fmla="*/ 0 w 990168"/>
-                <a:gd name="connsiteY7" fmla="*/ 916322 h 1040093"/>
-                <a:gd name="connsiteX8" fmla="*/ 0 w 990168"/>
-                <a:gd name="connsiteY8" fmla="*/ 123771 h 1040093"/>
-              </a:gdLst>
-              <a:ahLst/>
-              <a:cxnLst>
-                <a:cxn ang="0">
-                  <a:pos x="connsiteX0" y="connsiteY0"/>
-                </a:cxn>
-                <a:cxn ang="0">
-                  <a:pos x="connsiteX1" y="connsiteY1"/>
-                </a:cxn>
-                <a:cxn ang="0">
-                  <a:pos x="connsiteX2" y="connsiteY2"/>
-                </a:cxn>
-                <a:cxn ang="0">
-                  <a:pos x="connsiteX3" y="connsiteY3"/>
-                </a:cxn>
-                <a:cxn ang="0">
-                  <a:pos x="connsiteX4" y="connsiteY4"/>
-                </a:cxn>
-                <a:cxn ang="0">
-                  <a:pos x="connsiteX5" y="connsiteY5"/>
-                </a:cxn>
-                <a:cxn ang="0">
-                  <a:pos x="connsiteX6" y="connsiteY6"/>
-                </a:cxn>
-                <a:cxn ang="0">
-                  <a:pos x="connsiteX7" y="connsiteY7"/>
-                </a:cxn>
-                <a:cxn ang="0">
-                  <a:pos x="connsiteX8" y="connsiteY8"/>
-                </a:cxn>
-              </a:cxnLst>
-              <a:rect l="l" t="t" r="r" b="b"/>
-              <a:pathLst>
-                <a:path w="990168" h="1040093" stroke="0" extrusionOk="0">
-                  <a:moveTo>
-                    <a:pt x="0" y="123771"/>
-                  </a:moveTo>
-                  <a:cubicBezTo>
-                    <a:pt x="19628" y="170366"/>
-                    <a:pt x="212671" y="248011"/>
-                    <a:pt x="495084" y="247542"/>
-                  </a:cubicBezTo>
-                  <a:cubicBezTo>
-                    <a:pt x="781531" y="245908"/>
-                    <a:pt x="979050" y="194359"/>
-                    <a:pt x="990168" y="123771"/>
-                  </a:cubicBezTo>
-                  <a:cubicBezTo>
-                    <a:pt x="934788" y="414353"/>
-                    <a:pt x="1038825" y="677579"/>
-                    <a:pt x="990168" y="916322"/>
-                  </a:cubicBezTo>
-                  <a:cubicBezTo>
-                    <a:pt x="1006827" y="1013936"/>
-                    <a:pt x="747092" y="1002241"/>
-                    <a:pt x="495084" y="1040093"/>
-                  </a:cubicBezTo>
-                  <a:cubicBezTo>
-                    <a:pt x="218903" y="1052776"/>
-                    <a:pt x="-8151" y="988095"/>
-                    <a:pt x="0" y="916322"/>
-                  </a:cubicBezTo>
-                  <a:cubicBezTo>
-                    <a:pt x="3183" y="696157"/>
-                    <a:pt x="-68422" y="330146"/>
-                    <a:pt x="0" y="123771"/>
-                  </a:cubicBezTo>
-                  <a:close/>
-                </a:path>
-                <a:path w="990168" h="1040093" fill="lighten" stroke="0" extrusionOk="0">
-                  <a:moveTo>
-                    <a:pt x="0" y="123771"/>
-                  </a:moveTo>
-                  <a:cubicBezTo>
-                    <a:pt x="9867" y="96818"/>
-                    <a:pt x="193719" y="-9854"/>
-                    <a:pt x="495084" y="0"/>
-                  </a:cubicBezTo>
-                  <a:cubicBezTo>
-                    <a:pt x="764092" y="-12922"/>
-                    <a:pt x="995276" y="48736"/>
-                    <a:pt x="990168" y="123771"/>
-                  </a:cubicBezTo>
-                  <a:cubicBezTo>
-                    <a:pt x="997146" y="185469"/>
-                    <a:pt x="763028" y="264377"/>
-                    <a:pt x="495084" y="247542"/>
-                  </a:cubicBezTo>
-                  <a:cubicBezTo>
-                    <a:pt x="221522" y="249724"/>
-                    <a:pt x="297" y="195128"/>
-                    <a:pt x="0" y="123771"/>
-                  </a:cubicBezTo>
-                  <a:close/>
-                </a:path>
-                <a:path w="990168" h="1040093" fill="none" extrusionOk="0">
-                  <a:moveTo>
-                    <a:pt x="990168" y="123771"/>
-                  </a:moveTo>
-                  <a:cubicBezTo>
-                    <a:pt x="995415" y="183084"/>
-                    <a:pt x="765048" y="239641"/>
-                    <a:pt x="495084" y="247542"/>
-                  </a:cubicBezTo>
-                  <a:cubicBezTo>
-                    <a:pt x="225088" y="237436"/>
-                    <a:pt x="1896" y="187540"/>
-                    <a:pt x="0" y="123771"/>
-                  </a:cubicBezTo>
-                  <a:cubicBezTo>
-                    <a:pt x="20691" y="70866"/>
-                    <a:pt x="258751" y="-11698"/>
-                    <a:pt x="495084" y="0"/>
-                  </a:cubicBezTo>
-                  <a:cubicBezTo>
-                    <a:pt x="772107" y="2898"/>
-                    <a:pt x="992252" y="63504"/>
-                    <a:pt x="990168" y="123771"/>
-                  </a:cubicBezTo>
-                  <a:cubicBezTo>
-                    <a:pt x="965285" y="517667"/>
-                    <a:pt x="931267" y="790236"/>
-                    <a:pt x="990168" y="916322"/>
-                  </a:cubicBezTo>
-                  <a:cubicBezTo>
-                    <a:pt x="1009843" y="1011295"/>
-                    <a:pt x="758636" y="1043367"/>
-                    <a:pt x="495084" y="1040093"/>
-                  </a:cubicBezTo>
-                  <a:cubicBezTo>
-                    <a:pt x="218454" y="1044520"/>
-                    <a:pt x="1182" y="983825"/>
-                    <a:pt x="0" y="916322"/>
-                  </a:cubicBezTo>
-                  <a:cubicBezTo>
-                    <a:pt x="-30910" y="531940"/>
-                    <a:pt x="-17760" y="404728"/>
-                    <a:pt x="0" y="123771"/>
-                  </a:cubicBezTo>
-                </a:path>
-              </a:pathLst>
-            </a:custGeom>
-            <a:noFill/>
-            <a:ln>
-              <a:extLst>
-                <a:ext uri="{C807C97D-BFC1-408E-A445-0C87EB9F89A2}">
-                  <ask:lineSketchStyleProps xmlns="" xmlns:ask="http://schemas.microsoft.com/office/drawing/2018/sketchyshapes" sd="278935163">
-                    <a:prstGeom prst="can">
-                      <a:avLst/>
-                    </a:prstGeom>
-                    <ask:type>
-                      <ask:lineSketchCurved/>
-                    </ask:type>
-                  </ask:lineSketchStyleProps>
-                </a:ext>
-              </a:extLst>
-            </a:ln>
-          </p:spPr>
-          <p:style>
-            <a:lnRef idx="2">
-              <a:schemeClr val="accent1">
-                <a:shade val="15000"/>
-              </a:schemeClr>
-            </a:lnRef>
-            <a:fillRef idx="1">
-              <a:schemeClr val="accent1"/>
-            </a:fillRef>
-            <a:effectRef idx="0">
-              <a:schemeClr val="accent1"/>
-            </a:effectRef>
-            <a:fontRef idx="minor">
-              <a:schemeClr val="lt1"/>
-            </a:fontRef>
-          </p:style>
-          <p:txBody>
-            <a:bodyPr rtlCol="0" anchor="ctr"/>
-            <a:lstStyle/>
-            <a:p>
-              <a:pPr algn="ctr"/>
-              <a:endParaRPr lang="it-IT">
-                <a:latin typeface="Bahnschrift Light Condensed" panose="020B0502040204020203" pitchFamily="34" charset="0"/>
-              </a:endParaRPr>
-            </a:p>
-          </p:txBody>
-        </p:sp>
-        <p:pic>
-          <p:nvPicPr>
-            <p:cNvPr id="1026" name="Picture 2" descr="Cos'è MySQL e a cosa serve">
-              <a:extLst>
-                <a:ext uri="{FF2B5EF4-FFF2-40B4-BE49-F238E27FC236}">
-                  <a16:creationId xmlns:a16="http://schemas.microsoft.com/office/drawing/2014/main" id="{2FEC4067-2853-45F8-C292-38507F6473C5}"/>
-                </a:ext>
-              </a:extLst>
-            </p:cNvPr>
-            <p:cNvPicPr>
-              <a:picLocks noChangeAspect="1" noChangeArrowheads="1"/>
-            </p:cNvPicPr>
-            <p:nvPr/>
-          </p:nvPicPr>
-          <p:blipFill>
-            <a:blip r:embed="rId5" cstate="hqprint">
-              <a:extLst>
-                <a:ext uri="{28A0092B-C50C-407E-A947-70E740481C1C}">
-                  <a14:useLocalDpi xmlns:a14="http://schemas.microsoft.com/office/drawing/2010/main" val="0"/>
-                </a:ext>
-              </a:extLst>
-            </a:blip>
-            <a:srcRect/>
-            <a:stretch>
-              <a:fillRect/>
-            </a:stretch>
-          </p:blipFill>
-          <p:spPr bwMode="auto">
-            <a:xfrm>
-              <a:off x="7112791" y="3161927"/>
-              <a:ext cx="912531" cy="608354"/>
-            </a:xfrm>
-            <a:prstGeom prst="rect">
-              <a:avLst/>
-            </a:prstGeom>
-            <a:noFill/>
-            <a:extLst>
-              <a:ext uri="{909E8E84-426E-40DD-AFC4-6F175D3DCCD1}">
-                <a14:hiddenFill xmlns:a14="http://schemas.microsoft.com/office/drawing/2010/main">
-                  <a:solidFill>
-                    <a:srgbClr val="FFFFFF"/>
-                  </a:solidFill>
-                </a14:hiddenFill>
-              </a:ext>
-            </a:extLst>
-          </p:spPr>
-        </p:pic>
-      </p:grpSp>
+          <a:custGeom>
+            <a:avLst/>
+            <a:gdLst>
+              <a:gd name="connsiteX0" fmla="*/ 0 w 758741"/>
+              <a:gd name="connsiteY0" fmla="*/ 94843 h 928307"/>
+              <a:gd name="connsiteX1" fmla="*/ 379371 w 758741"/>
+              <a:gd name="connsiteY1" fmla="*/ 189686 h 928307"/>
+              <a:gd name="connsiteX2" fmla="*/ 758742 w 758741"/>
+              <a:gd name="connsiteY2" fmla="*/ 94843 h 928307"/>
+              <a:gd name="connsiteX3" fmla="*/ 758741 w 758741"/>
+              <a:gd name="connsiteY3" fmla="*/ 833464 h 928307"/>
+              <a:gd name="connsiteX4" fmla="*/ 379370 w 758741"/>
+              <a:gd name="connsiteY4" fmla="*/ 928307 h 928307"/>
+              <a:gd name="connsiteX5" fmla="*/ -1 w 758741"/>
+              <a:gd name="connsiteY5" fmla="*/ 833464 h 928307"/>
+              <a:gd name="connsiteX6" fmla="*/ 0 w 758741"/>
+              <a:gd name="connsiteY6" fmla="*/ 94843 h 928307"/>
+              <a:gd name="connsiteX0" fmla="*/ 0 w 758741"/>
+              <a:gd name="connsiteY0" fmla="*/ 94843 h 928307"/>
+              <a:gd name="connsiteX1" fmla="*/ 379371 w 758741"/>
+              <a:gd name="connsiteY1" fmla="*/ 0 h 928307"/>
+              <a:gd name="connsiteX2" fmla="*/ 758742 w 758741"/>
+              <a:gd name="connsiteY2" fmla="*/ 94843 h 928307"/>
+              <a:gd name="connsiteX3" fmla="*/ 379371 w 758741"/>
+              <a:gd name="connsiteY3" fmla="*/ 189686 h 928307"/>
+              <a:gd name="connsiteX4" fmla="*/ 0 w 758741"/>
+              <a:gd name="connsiteY4" fmla="*/ 94843 h 928307"/>
+              <a:gd name="connsiteX0" fmla="*/ 758741 w 758741"/>
+              <a:gd name="connsiteY0" fmla="*/ 94843 h 928307"/>
+              <a:gd name="connsiteX1" fmla="*/ 379370 w 758741"/>
+              <a:gd name="connsiteY1" fmla="*/ 189686 h 928307"/>
+              <a:gd name="connsiteX2" fmla="*/ -1 w 758741"/>
+              <a:gd name="connsiteY2" fmla="*/ 94843 h 928307"/>
+              <a:gd name="connsiteX3" fmla="*/ 379370 w 758741"/>
+              <a:gd name="connsiteY3" fmla="*/ 0 h 928307"/>
+              <a:gd name="connsiteX4" fmla="*/ 758741 w 758741"/>
+              <a:gd name="connsiteY4" fmla="*/ 94843 h 928307"/>
+              <a:gd name="connsiteX5" fmla="*/ 758741 w 758741"/>
+              <a:gd name="connsiteY5" fmla="*/ 833464 h 928307"/>
+              <a:gd name="connsiteX6" fmla="*/ 379370 w 758741"/>
+              <a:gd name="connsiteY6" fmla="*/ 928307 h 928307"/>
+              <a:gd name="connsiteX7" fmla="*/ -1 w 758741"/>
+              <a:gd name="connsiteY7" fmla="*/ 833464 h 928307"/>
+              <a:gd name="connsiteX8" fmla="*/ 0 w 758741"/>
+              <a:gd name="connsiteY8" fmla="*/ 94843 h 928307"/>
+            </a:gdLst>
+            <a:ahLst/>
+            <a:cxnLst>
+              <a:cxn ang="0">
+                <a:pos x="connsiteX0" y="connsiteY0"/>
+              </a:cxn>
+              <a:cxn ang="0">
+                <a:pos x="connsiteX1" y="connsiteY1"/>
+              </a:cxn>
+              <a:cxn ang="0">
+                <a:pos x="connsiteX2" y="connsiteY2"/>
+              </a:cxn>
+              <a:cxn ang="0">
+                <a:pos x="connsiteX3" y="connsiteY3"/>
+              </a:cxn>
+              <a:cxn ang="0">
+                <a:pos x="connsiteX4" y="connsiteY4"/>
+              </a:cxn>
+              <a:cxn ang="0">
+                <a:pos x="connsiteX5" y="connsiteY5"/>
+              </a:cxn>
+              <a:cxn ang="0">
+                <a:pos x="connsiteX6" y="connsiteY6"/>
+              </a:cxn>
+              <a:cxn ang="0">
+                <a:pos x="connsiteX7" y="connsiteY7"/>
+              </a:cxn>
+              <a:cxn ang="0">
+                <a:pos x="connsiteX8" y="connsiteY8"/>
+              </a:cxn>
+            </a:cxnLst>
+            <a:rect l="l" t="t" r="r" b="b"/>
+            <a:pathLst>
+              <a:path w="758741" h="928307" stroke="0" extrusionOk="0">
+                <a:moveTo>
+                  <a:pt x="0" y="94843"/>
+                </a:moveTo>
+                <a:cubicBezTo>
+                  <a:pt x="13379" y="132390"/>
+                  <a:pt x="141810" y="191150"/>
+                  <a:pt x="379371" y="189686"/>
+                </a:cubicBezTo>
+                <a:cubicBezTo>
+                  <a:pt x="598755" y="188448"/>
+                  <a:pt x="756645" y="147644"/>
+                  <a:pt x="758742" y="94843"/>
+                </a:cubicBezTo>
+                <a:cubicBezTo>
+                  <a:pt x="746149" y="346638"/>
+                  <a:pt x="785014" y="618298"/>
+                  <a:pt x="758741" y="833464"/>
+                </a:cubicBezTo>
+                <a:cubicBezTo>
+                  <a:pt x="772422" y="909871"/>
+                  <a:pt x="575304" y="904296"/>
+                  <a:pt x="379370" y="928307"/>
+                </a:cubicBezTo>
+                <a:cubicBezTo>
+                  <a:pt x="169424" y="930264"/>
+                  <a:pt x="-2554" y="886914"/>
+                  <a:pt x="-1" y="833464"/>
+                </a:cubicBezTo>
+                <a:cubicBezTo>
+                  <a:pt x="5715" y="601363"/>
+                  <a:pt x="37447" y="327826"/>
+                  <a:pt x="0" y="94843"/>
+                </a:cubicBezTo>
+                <a:close/>
+              </a:path>
+              <a:path w="758741" h="928307" fill="lighten" stroke="0" extrusionOk="0">
+                <a:moveTo>
+                  <a:pt x="0" y="94843"/>
+                </a:moveTo>
+                <a:cubicBezTo>
+                  <a:pt x="685" y="45338"/>
+                  <a:pt x="153310" y="-5834"/>
+                  <a:pt x="379371" y="0"/>
+                </a:cubicBezTo>
+                <a:cubicBezTo>
+                  <a:pt x="585949" y="-8606"/>
+                  <a:pt x="764229" y="35289"/>
+                  <a:pt x="758742" y="94843"/>
+                </a:cubicBezTo>
+                <a:cubicBezTo>
+                  <a:pt x="773327" y="133303"/>
+                  <a:pt x="582008" y="210823"/>
+                  <a:pt x="379371" y="189686"/>
+                </a:cubicBezTo>
+                <a:cubicBezTo>
+                  <a:pt x="169636" y="193144"/>
+                  <a:pt x="157" y="148810"/>
+                  <a:pt x="0" y="94843"/>
+                </a:cubicBezTo>
+                <a:close/>
+              </a:path>
+              <a:path w="758741" h="928307" fill="none" extrusionOk="0">
+                <a:moveTo>
+                  <a:pt x="758741" y="94843"/>
+                </a:moveTo>
+                <a:cubicBezTo>
+                  <a:pt x="766701" y="133501"/>
+                  <a:pt x="578073" y="165007"/>
+                  <a:pt x="379370" y="189686"/>
+                </a:cubicBezTo>
+                <a:cubicBezTo>
+                  <a:pt x="170988" y="186331"/>
+                  <a:pt x="2299" y="141660"/>
+                  <a:pt x="-1" y="94843"/>
+                </a:cubicBezTo>
+                <a:cubicBezTo>
+                  <a:pt x="22054" y="58934"/>
+                  <a:pt x="180798" y="-3453"/>
+                  <a:pt x="379370" y="0"/>
+                </a:cubicBezTo>
+                <a:cubicBezTo>
+                  <a:pt x="594639" y="4633"/>
+                  <a:pt x="759362" y="44875"/>
+                  <a:pt x="758741" y="94843"/>
+                </a:cubicBezTo>
+                <a:cubicBezTo>
+                  <a:pt x="752519" y="447162"/>
+                  <a:pt x="749883" y="465217"/>
+                  <a:pt x="758741" y="833464"/>
+                </a:cubicBezTo>
+                <a:cubicBezTo>
+                  <a:pt x="764406" y="893508"/>
+                  <a:pt x="568873" y="934943"/>
+                  <a:pt x="379370" y="928307"/>
+                </a:cubicBezTo>
+                <a:cubicBezTo>
+                  <a:pt x="166397" y="933079"/>
+                  <a:pt x="6246" y="881329"/>
+                  <a:pt x="-1" y="833464"/>
+                </a:cubicBezTo>
+                <a:cubicBezTo>
+                  <a:pt x="15409" y="543904"/>
+                  <a:pt x="14633" y="372044"/>
+                  <a:pt x="0" y="94843"/>
+                </a:cubicBezTo>
+              </a:path>
+            </a:pathLst>
+          </a:custGeom>
+          <a:noFill/>
+          <a:ln>
+            <a:extLst>
+              <a:ext uri="{C807C97D-BFC1-408E-A445-0C87EB9F89A2}">
+                <ask:lineSketchStyleProps xmlns:ask="http://schemas.microsoft.com/office/drawing/2018/sketchyshapes" sd="278935163">
+                  <a:prstGeom prst="can">
+                    <a:avLst/>
+                  </a:prstGeom>
+                  <ask:type>
+                    <ask:lineSketchCurved/>
+                  </ask:type>
+                </ask:lineSketchStyleProps>
+              </a:ext>
+            </a:extLst>
+          </a:ln>
+        </p:spPr>
+        <p:style>
+          <a:lnRef idx="2">
+            <a:schemeClr val="accent1">
+              <a:shade val="15000"/>
+            </a:schemeClr>
+          </a:lnRef>
+          <a:fillRef idx="1">
+            <a:schemeClr val="accent1"/>
+          </a:fillRef>
+          <a:effectRef idx="0">
+            <a:schemeClr val="accent1"/>
+          </a:effectRef>
+          <a:fontRef idx="minor">
+            <a:schemeClr val="lt1"/>
+          </a:fontRef>
+        </p:style>
+        <p:txBody>
+          <a:bodyPr rtlCol="0" anchor="ctr"/>
+          <a:lstStyle/>
+          <a:p>
+            <a:pPr algn="ctr"/>
+            <a:endParaRPr lang="it-IT">
+              <a:latin typeface="Bahnschrift Light Condensed" panose="020B0502040204020203" pitchFamily="34" charset="0"/>
+            </a:endParaRPr>
+          </a:p>
+        </p:txBody>
+      </p:sp>
+      <p:pic>
+        <p:nvPicPr>
+          <p:cNvPr id="1026" name="Picture 2" descr="Cos'è MySQL e a cosa serve">
+            <a:extLst>
+              <a:ext uri="{FF2B5EF4-FFF2-40B4-BE49-F238E27FC236}">
+                <a16:creationId xmlns:a16="http://schemas.microsoft.com/office/drawing/2014/main" id="{2FEC4067-2853-45F8-C292-38507F6473C5}"/>
+              </a:ext>
+            </a:extLst>
+          </p:cNvPr>
+          <p:cNvPicPr>
+            <a:picLocks noChangeAspect="1" noChangeArrowheads="1"/>
+          </p:cNvPicPr>
+          <p:nvPr/>
+        </p:nvPicPr>
+        <p:blipFill>
+          <a:blip r:embed="rId5" cstate="hqprint">
+            <a:extLst>
+              <a:ext uri="{28A0092B-C50C-407E-A947-70E740481C1C}">
+                <a14:useLocalDpi xmlns:a14="http://schemas.microsoft.com/office/drawing/2010/main" val="0"/>
+              </a:ext>
+            </a:extLst>
+          </a:blip>
+          <a:srcRect/>
+          <a:stretch>
+            <a:fillRect/>
+          </a:stretch>
+        </p:blipFill>
+        <p:spPr bwMode="auto">
+          <a:xfrm>
+            <a:off x="7060142" y="2701558"/>
+            <a:ext cx="738549" cy="492366"/>
+          </a:xfrm>
+          <a:prstGeom prst="rect">
+            <a:avLst/>
+          </a:prstGeom>
+          <a:noFill/>
+          <a:extLst>
+            <a:ext uri="{909E8E84-426E-40DD-AFC4-6F175D3DCCD1}">
+              <a14:hiddenFill xmlns:a14="http://schemas.microsoft.com/office/drawing/2010/main">
+                <a:solidFill>
+                  <a:srgbClr val="FFFFFF"/>
+                </a:solidFill>
+              </a14:hiddenFill>
+            </a:ext>
+          </a:extLst>
+        </p:spPr>
+      </p:pic>
       <p:cxnSp>
         <p:nvCxnSpPr>
           <p:cNvPr id="99" name="Connettore 2 98">
@@ -7357,28 +7319,28 @@
             <a:gdLst>
               <a:gd name="connsiteX0" fmla="*/ 0 w 2271384"/>
               <a:gd name="connsiteY0" fmla="*/ 0 h 967348"/>
-              <a:gd name="connsiteX1" fmla="*/ 567846 w 2271384"/>
+              <a:gd name="connsiteX1" fmla="*/ 545132 w 2271384"/>
               <a:gd name="connsiteY1" fmla="*/ 0 h 967348"/>
-              <a:gd name="connsiteX2" fmla="*/ 1135692 w 2271384"/>
+              <a:gd name="connsiteX2" fmla="*/ 1067550 w 2271384"/>
               <a:gd name="connsiteY2" fmla="*/ 0 h 967348"/>
-              <a:gd name="connsiteX3" fmla="*/ 1748966 w 2271384"/>
+              <a:gd name="connsiteX3" fmla="*/ 1612683 w 2271384"/>
               <a:gd name="connsiteY3" fmla="*/ 0 h 967348"/>
               <a:gd name="connsiteX4" fmla="*/ 2271384 w 2271384"/>
               <a:gd name="connsiteY4" fmla="*/ 0 h 967348"/>
               <a:gd name="connsiteX5" fmla="*/ 2271384 w 2271384"/>
-              <a:gd name="connsiteY5" fmla="*/ 474001 h 967348"/>
+              <a:gd name="connsiteY5" fmla="*/ 503021 h 967348"/>
               <a:gd name="connsiteX6" fmla="*/ 2271384 w 2271384"/>
               <a:gd name="connsiteY6" fmla="*/ 967348 h 967348"/>
-              <a:gd name="connsiteX7" fmla="*/ 1703538 w 2271384"/>
+              <a:gd name="connsiteX7" fmla="*/ 1771680 w 2271384"/>
               <a:gd name="connsiteY7" fmla="*/ 967348 h 967348"/>
               <a:gd name="connsiteX8" fmla="*/ 1181120 w 2271384"/>
               <a:gd name="connsiteY8" fmla="*/ 967348 h 967348"/>
-              <a:gd name="connsiteX9" fmla="*/ 590560 w 2271384"/>
+              <a:gd name="connsiteX9" fmla="*/ 613274 w 2271384"/>
               <a:gd name="connsiteY9" fmla="*/ 967348 h 967348"/>
               <a:gd name="connsiteX10" fmla="*/ 0 w 2271384"/>
               <a:gd name="connsiteY10" fmla="*/ 967348 h 967348"/>
               <a:gd name="connsiteX11" fmla="*/ 0 w 2271384"/>
-              <a:gd name="connsiteY11" fmla="*/ 503021 h 967348"/>
+              <a:gd name="connsiteY11" fmla="*/ 483674 h 967348"/>
               <a:gd name="connsiteX12" fmla="*/ 0 w 2271384"/>
               <a:gd name="connsiteY12" fmla="*/ 0 h 967348"/>
             </a:gdLst>
@@ -7426,73 +7388,7 @@
             </a:cxnLst>
             <a:rect l="l" t="t" r="r" b="b"/>
             <a:pathLst>
-              <a:path w="2271384" h="967348" fill="none" extrusionOk="0">
-                <a:moveTo>
-                  <a:pt x="0" y="0"/>
-                </a:moveTo>
-                <a:cubicBezTo>
-                  <a:pt x="147421" y="-18868"/>
-                  <a:pt x="439827" y="-9206"/>
-                  <a:pt x="567846" y="0"/>
-                </a:cubicBezTo>
-                <a:cubicBezTo>
-                  <a:pt x="695865" y="9206"/>
-                  <a:pt x="924039" y="16"/>
-                  <a:pt x="1135692" y="0"/>
-                </a:cubicBezTo>
-                <a:cubicBezTo>
-                  <a:pt x="1347345" y="-16"/>
-                  <a:pt x="1447637" y="-29162"/>
-                  <a:pt x="1748966" y="0"/>
-                </a:cubicBezTo>
-                <a:cubicBezTo>
-                  <a:pt x="2050295" y="29162"/>
-                  <a:pt x="2048106" y="14774"/>
-                  <a:pt x="2271384" y="0"/>
-                </a:cubicBezTo>
-                <a:cubicBezTo>
-                  <a:pt x="2263741" y="96905"/>
-                  <a:pt x="2289254" y="375349"/>
-                  <a:pt x="2271384" y="474001"/>
-                </a:cubicBezTo>
-                <a:cubicBezTo>
-                  <a:pt x="2253514" y="572653"/>
-                  <a:pt x="2271603" y="753491"/>
-                  <a:pt x="2271384" y="967348"/>
-                </a:cubicBezTo>
-                <a:cubicBezTo>
-                  <a:pt x="2016794" y="991329"/>
-                  <a:pt x="1824679" y="939036"/>
-                  <a:pt x="1703538" y="967348"/>
-                </a:cubicBezTo>
-                <a:cubicBezTo>
-                  <a:pt x="1582397" y="995660"/>
-                  <a:pt x="1390454" y="974846"/>
-                  <a:pt x="1181120" y="967348"/>
-                </a:cubicBezTo>
-                <a:cubicBezTo>
-                  <a:pt x="971786" y="959850"/>
-                  <a:pt x="803503" y="996180"/>
-                  <a:pt x="590560" y="967348"/>
-                </a:cubicBezTo>
-                <a:cubicBezTo>
-                  <a:pt x="377617" y="938516"/>
-                  <a:pt x="228649" y="967400"/>
-                  <a:pt x="0" y="967348"/>
-                </a:cubicBezTo>
-                <a:cubicBezTo>
-                  <a:pt x="-11107" y="741673"/>
-                  <a:pt x="22155" y="630406"/>
-                  <a:pt x="0" y="503021"/>
-                </a:cubicBezTo>
-                <a:cubicBezTo>
-                  <a:pt x="-22155" y="375636"/>
-                  <a:pt x="-12687" y="237858"/>
-                  <a:pt x="0" y="0"/>
-                </a:cubicBezTo>
-                <a:close/>
-              </a:path>
-              <a:path w="2271384" h="967348" stroke="0" extrusionOk="0">
+              <a:path w="2271384" h="967348" extrusionOk="0">
                 <a:moveTo>
                   <a:pt x="0" y="0"/>
                 </a:moveTo>
@@ -7564,7 +7460,7 @@
           <a:ln>
             <a:extLst>
               <a:ext uri="{C807C97D-BFC1-408E-A445-0C87EB9F89A2}">
-                <ask:lineSketchStyleProps xmlns="" xmlns:ask="http://schemas.microsoft.com/office/drawing/2018/sketchyshapes" sd="2244232375">
+                <ask:lineSketchStyleProps xmlns:ask="http://schemas.microsoft.com/office/drawing/2018/sketchyshapes" sd="2244232375">
                   <a:prstGeom prst="rect">
                     <a:avLst/>
                   </a:prstGeom>
@@ -7880,7 +7776,7 @@
           <a:ln>
             <a:extLst>
               <a:ext uri="{C807C97D-BFC1-408E-A445-0C87EB9F89A2}">
-                <ask:lineSketchStyleProps xmlns="" xmlns:ask="http://schemas.microsoft.com/office/drawing/2018/sketchyshapes" sd="2244232375">
+                <ask:lineSketchStyleProps xmlns:ask="http://schemas.microsoft.com/office/drawing/2018/sketchyshapes" sd="2244232375">
                   <a:prstGeom prst="rect">
                     <a:avLst/>
                   </a:prstGeom>
@@ -8063,7 +7959,7 @@
           <a:ln w="9525">
             <a:extLst>
               <a:ext uri="{C807C97D-BFC1-408E-A445-0C87EB9F89A2}">
-                <ask:lineSketchStyleProps xmlns="" xmlns:ask="http://schemas.microsoft.com/office/drawing/2018/sketchyshapes" sd="1725041551">
+                <ask:lineSketchStyleProps xmlns:ask="http://schemas.microsoft.com/office/drawing/2018/sketchyshapes" sd="1725041551">
                   <a:prstGeom prst="rect">
                     <a:avLst/>
                   </a:prstGeom>
@@ -8451,7 +8347,7 @@
           <a:ln w="9525">
             <a:extLst>
               <a:ext uri="{C807C97D-BFC1-408E-A445-0C87EB9F89A2}">
-                <ask:lineSketchStyleProps xmlns="" xmlns:ask="http://schemas.microsoft.com/office/drawing/2018/sketchyshapes" sd="1725041551">
+                <ask:lineSketchStyleProps xmlns:ask="http://schemas.microsoft.com/office/drawing/2018/sketchyshapes" sd="1725041551">
                   <a:prstGeom prst="rect">
                     <a:avLst/>
                   </a:prstGeom>
@@ -8644,7 +8540,7 @@
           <a:ln w="9525">
             <a:extLst>
               <a:ext uri="{C807C97D-BFC1-408E-A445-0C87EB9F89A2}">
-                <ask:lineSketchStyleProps xmlns="" xmlns:ask="http://schemas.microsoft.com/office/drawing/2018/sketchyshapes" sd="1725041551">
+                <ask:lineSketchStyleProps xmlns:ask="http://schemas.microsoft.com/office/drawing/2018/sketchyshapes" sd="1725041551">
                   <a:prstGeom prst="rect">
                     <a:avLst/>
                   </a:prstGeom>
@@ -8778,7 +8674,7 @@
           <a:lstStyle/>
           <a:p>
             <a:r>
-              <a:rPr lang="it-IT" sz="700" smtClean="0">
+              <a:rPr lang="it-IT" sz="700">
                 <a:latin typeface="Bahnschrift Light Condensed" panose="020B0502040204020203" pitchFamily="34" charset="0"/>
               </a:rPr>
               <a:t>10sec</a:t>
@@ -9043,7 +8939,7 @@
           <a:ln>
             <a:extLst>
               <a:ext uri="{C807C97D-BFC1-408E-A445-0C87EB9F89A2}">
-                <ask:lineSketchStyleProps xmlns="" xmlns:ask="http://schemas.microsoft.com/office/drawing/2018/sketchyshapes" sd="2244232375">
+                <ask:lineSketchStyleProps xmlns:ask="http://schemas.microsoft.com/office/drawing/2018/sketchyshapes" sd="2244232375">
                   <a:prstGeom prst="rect">
                     <a:avLst/>
                   </a:prstGeom>
@@ -9235,7 +9131,7 @@
           <a:ln w="9525">
             <a:extLst>
               <a:ext uri="{C807C97D-BFC1-408E-A445-0C87EB9F89A2}">
-                <ask:lineSketchStyleProps xmlns="" xmlns:ask="http://schemas.microsoft.com/office/drawing/2018/sketchyshapes" sd="1725041551">
+                <ask:lineSketchStyleProps xmlns:ask="http://schemas.microsoft.com/office/drawing/2018/sketchyshapes" sd="1725041551">
                   <a:prstGeom prst="rect">
                     <a:avLst/>
                   </a:prstGeom>
@@ -9616,7 +9512,7 @@
           <a:ln w="9525">
             <a:extLst>
               <a:ext uri="{C807C97D-BFC1-408E-A445-0C87EB9F89A2}">
-                <ask:lineSketchStyleProps xmlns="" xmlns:ask="http://schemas.microsoft.com/office/drawing/2018/sketchyshapes" sd="1725041551">
+                <ask:lineSketchStyleProps xmlns:ask="http://schemas.microsoft.com/office/drawing/2018/sketchyshapes" sd="1725041551">
                   <a:prstGeom prst="rect">
                     <a:avLst/>
                   </a:prstGeom>
@@ -9868,7 +9764,7 @@
           <a:ln>
             <a:extLst>
               <a:ext uri="{C807C97D-BFC1-408E-A445-0C87EB9F89A2}">
-                <ask:lineSketchStyleProps xmlns="" xmlns:ask="http://schemas.microsoft.com/office/drawing/2018/sketchyshapes" sd="2244232375">
+                <ask:lineSketchStyleProps xmlns:ask="http://schemas.microsoft.com/office/drawing/2018/sketchyshapes" sd="2244232375">
                   <a:prstGeom prst="rect">
                     <a:avLst/>
                   </a:prstGeom>
@@ -10664,7 +10560,7 @@
           <a:lstStyle/>
           <a:p>
             <a:r>
-              <a:rPr lang="it-IT" sz="1200" smtClean="0">
+              <a:rPr lang="it-IT" sz="1200">
                 <a:latin typeface="Bahnschrift Light Condensed" panose="020B0502040204020203" pitchFamily="34" charset="0"/>
               </a:rPr>
               <a:t>3306</a:t>
@@ -10698,20 +10594,19 @@
           <a:lstStyle/>
           <a:p>
             <a:r>
-              <a:rPr lang="it-IT" sz="1200" b="1" smtClean="0"/>
+              <a:rPr lang="it-IT" sz="1200" b="1"/>
               <a:t>Distributed System and Big Data</a:t>
             </a:r>
             <a:r>
-              <a:rPr lang="it-IT" sz="1200" smtClean="0"/>
+              <a:rPr lang="it-IT" sz="1200"/>
               <a:t> – A.A. 2023/24 - Unict</a:t>
             </a:r>
           </a:p>
           <a:p>
             <a:r>
-              <a:rPr lang="it-IT" sz="1200" smtClean="0"/>
+              <a:rPr lang="it-IT" sz="1200"/>
               <a:t>Schema progetto (prima parte) di Francesco Pandolfo</a:t>
             </a:r>
-            <a:endParaRPr lang="it-IT" sz="1200"/>
           </a:p>
         </p:txBody>
       </p:sp>
@@ -10778,8 +10673,8 @@
         </p:blipFill>
         <p:spPr>
           <a:xfrm>
-            <a:off x="9938921" y="2572571"/>
-            <a:ext cx="1067130" cy="355375"/>
+            <a:off x="9972713" y="588509"/>
+            <a:ext cx="1410062" cy="469578"/>
           </a:xfrm>
           <a:prstGeom prst="rect">
             <a:avLst/>
@@ -10815,10 +10710,171 @@
           <a:lstStyle/>
           <a:p>
             <a:r>
-              <a:rPr lang="it-IT" sz="1200" smtClean="0">
+              <a:rPr lang="it-IT" sz="1200">
                 <a:latin typeface="Bahnschrift Light Condensed" panose="020B0502040204020203" pitchFamily="34" charset="0"/>
               </a:rPr>
               <a:t>9092</a:t>
+            </a:r>
+            <a:endParaRPr lang="it-IT">
+              <a:latin typeface="Bahnschrift Light Condensed" panose="020B0502040204020203" pitchFamily="34" charset="0"/>
+            </a:endParaRPr>
+          </a:p>
+        </p:txBody>
+      </p:sp>
+      <p:sp>
+        <p:nvSpPr>
+          <p:cNvPr id="2" name="Ovale 1">
+            <a:extLst>
+              <a:ext uri="{FF2B5EF4-FFF2-40B4-BE49-F238E27FC236}">
+                <a16:creationId xmlns:a16="http://schemas.microsoft.com/office/drawing/2014/main" id="{5EB092F9-4698-CD5C-2A05-582F95F84E2C}"/>
+              </a:ext>
+            </a:extLst>
+          </p:cNvPr>
+          <p:cNvSpPr/>
+          <p:nvPr/>
+        </p:nvSpPr>
+        <p:spPr>
+          <a:xfrm>
+            <a:off x="9251818" y="324661"/>
+            <a:ext cx="2703472" cy="3617806"/>
+          </a:xfrm>
+          <a:custGeom>
+            <a:avLst/>
+            <a:gdLst>
+              <a:gd name="connsiteX0" fmla="*/ 0 w 2703472"/>
+              <a:gd name="connsiteY0" fmla="*/ 1808903 h 3617806"/>
+              <a:gd name="connsiteX1" fmla="*/ 1351736 w 2703472"/>
+              <a:gd name="connsiteY1" fmla="*/ 0 h 3617806"/>
+              <a:gd name="connsiteX2" fmla="*/ 2703472 w 2703472"/>
+              <a:gd name="connsiteY2" fmla="*/ 1808903 h 3617806"/>
+              <a:gd name="connsiteX3" fmla="*/ 1351736 w 2703472"/>
+              <a:gd name="connsiteY3" fmla="*/ 3617806 h 3617806"/>
+              <a:gd name="connsiteX4" fmla="*/ 0 w 2703472"/>
+              <a:gd name="connsiteY4" fmla="*/ 1808903 h 3617806"/>
+            </a:gdLst>
+            <a:ahLst/>
+            <a:cxnLst>
+              <a:cxn ang="0">
+                <a:pos x="connsiteX0" y="connsiteY0"/>
+              </a:cxn>
+              <a:cxn ang="0">
+                <a:pos x="connsiteX1" y="connsiteY1"/>
+              </a:cxn>
+              <a:cxn ang="0">
+                <a:pos x="connsiteX2" y="connsiteY2"/>
+              </a:cxn>
+              <a:cxn ang="0">
+                <a:pos x="connsiteX3" y="connsiteY3"/>
+              </a:cxn>
+              <a:cxn ang="0">
+                <a:pos x="connsiteX4" y="connsiteY4"/>
+              </a:cxn>
+            </a:cxnLst>
+            <a:rect l="l" t="t" r="r" b="b"/>
+            <a:pathLst>
+              <a:path w="2703472" h="3617806" extrusionOk="0">
+                <a:moveTo>
+                  <a:pt x="0" y="1808903"/>
+                </a:moveTo>
+                <a:cubicBezTo>
+                  <a:pt x="-12256" y="884042"/>
+                  <a:pt x="606728" y="67969"/>
+                  <a:pt x="1351736" y="0"/>
+                </a:cubicBezTo>
+                <a:cubicBezTo>
+                  <a:pt x="2139936" y="-22065"/>
+                  <a:pt x="2922046" y="703030"/>
+                  <a:pt x="2703472" y="1808903"/>
+                </a:cubicBezTo>
+                <a:cubicBezTo>
+                  <a:pt x="2826751" y="2780181"/>
+                  <a:pt x="2092890" y="3740463"/>
+                  <a:pt x="1351736" y="3617806"/>
+                </a:cubicBezTo>
+                <a:cubicBezTo>
+                  <a:pt x="645579" y="3681785"/>
+                  <a:pt x="-173189" y="2629092"/>
+                  <a:pt x="0" y="1808903"/>
+                </a:cubicBezTo>
+                <a:close/>
+              </a:path>
+            </a:pathLst>
+          </a:custGeom>
+          <a:noFill/>
+          <a:ln>
+            <a:prstDash val="dash"/>
+            <a:extLst>
+              <a:ext uri="{C807C97D-BFC1-408E-A445-0C87EB9F89A2}">
+                <ask:lineSketchStyleProps xmlns:ask="http://schemas.microsoft.com/office/drawing/2018/sketchyshapes" sd="1634779923">
+                  <a:prstGeom prst="ellipse">
+                    <a:avLst/>
+                  </a:prstGeom>
+                  <ask:type>
+                    <ask:lineSketchFreehand/>
+                  </ask:type>
+                </ask:lineSketchStyleProps>
+              </a:ext>
+            </a:extLst>
+          </a:ln>
+        </p:spPr>
+        <p:style>
+          <a:lnRef idx="2">
+            <a:schemeClr val="accent1">
+              <a:shade val="15000"/>
+            </a:schemeClr>
+          </a:lnRef>
+          <a:fillRef idx="1">
+            <a:schemeClr val="accent1"/>
+          </a:fillRef>
+          <a:effectRef idx="0">
+            <a:schemeClr val="accent1"/>
+          </a:effectRef>
+          <a:fontRef idx="minor">
+            <a:schemeClr val="lt1"/>
+          </a:fontRef>
+        </p:style>
+        <p:txBody>
+          <a:bodyPr rtlCol="0" anchor="ctr"/>
+          <a:lstStyle/>
+          <a:p>
+            <a:pPr algn="ctr"/>
+            <a:endParaRPr lang="it-IT"/>
+          </a:p>
+        </p:txBody>
+      </p:sp>
+      <p:sp>
+        <p:nvSpPr>
+          <p:cNvPr id="3" name="CasellaDiTesto 2">
+            <a:extLst>
+              <a:ext uri="{FF2B5EF4-FFF2-40B4-BE49-F238E27FC236}">
+                <a16:creationId xmlns:a16="http://schemas.microsoft.com/office/drawing/2014/main" id="{14F79A08-3895-F8BA-1BE0-93FAC3CF3A6E}"/>
+              </a:ext>
+            </a:extLst>
+          </p:cNvPr>
+          <p:cNvSpPr txBox="1"/>
+          <p:nvPr/>
+        </p:nvSpPr>
+        <p:spPr>
+          <a:xfrm>
+            <a:off x="10451548" y="332761"/>
+            <a:ext cx="381836" cy="276999"/>
+          </a:xfrm>
+          <a:prstGeom prst="rect">
+            <a:avLst/>
+          </a:prstGeom>
+          <a:noFill/>
+        </p:spPr>
+        <p:txBody>
+          <a:bodyPr wrap="none" rtlCol="0">
+            <a:spAutoFit/>
+          </a:bodyPr>
+          <a:lstStyle/>
+          <a:p>
+            <a:r>
+              <a:rPr lang="it-IT" sz="1200">
+                <a:latin typeface="Bahnschrift Light Condensed" panose="020B0502040204020203" pitchFamily="34" charset="0"/>
+              </a:rPr>
+              <a:t>VPN</a:t>
             </a:r>
             <a:endParaRPr lang="it-IT">
               <a:latin typeface="Bahnschrift Light Condensed" panose="020B0502040204020203" pitchFamily="34" charset="0"/>
@@ -10836,13 +10892,6 @@
   <p:clrMapOvr>
     <a:masterClrMapping/>
   </p:clrMapOvr>
-  <p:timing>
-    <p:tnLst>
-      <p:par>
-        <p:cTn id="1" dur="indefinite" restart="never" nodeType="tmRoot"/>
-      </p:par>
-    </p:tnLst>
-  </p:timing>
 </p:sld>
 </file>
 

</xml_diff>